<commit_message>
Charts basically working, with static chart
</commit_message>
<xml_diff>
--- a/test/files/parts3-a.pptx
+++ b/test/files/parts3-a.pptx
@@ -108,6 +108,269 @@
     </a:lvl9pPr>
   </p:defaultTextStyle>
 </p:presentation>
+</file>
+
+<file path=ppt/charts/chart1.xml><?xml version="1.0" encoding="utf-8"?>
+<c:chartSpace xmlns:c="http://schemas.openxmlformats.org/drawingml/2006/chart" xmlns:a="http://schemas.openxmlformats.org/drawingml/2006/main" xmlns:r="http://schemas.openxmlformats.org/officeDocument/2006/relationships">
+  <c:date1904 val="0"/>
+  <c:lang val="en-US"/>
+  <c:roundedCorners val="0"/>
+  <mc:AlternateContent xmlns:mc="http://schemas.openxmlformats.org/markup-compatibility/2006">
+    <mc:Choice xmlns:c14="http://schemas.microsoft.com/office/drawing/2007/8/2/chart" Requires="c14">
+      <c14:style val="118"/>
+    </mc:Choice>
+    <mc:Fallback>
+      <c:style val="18"/>
+    </mc:Fallback>
+  </mc:AlternateContent>
+  <c:chart>
+    <c:autoTitleDeleted val="0"/>
+    <c:plotArea>
+      <c:layout/>
+      <c:barChart>
+        <c:barDir val="bar"/>
+        <c:grouping val="clustered"/>
+        <c:varyColors val="0"/>
+        <c:ser>
+          <c:idx val="0"/>
+          <c:order val="0"/>
+          <c:tx>
+            <c:strRef>
+              <c:f>Sheet1!$B$1</c:f>
+              <c:strCache>
+                <c:ptCount val="1"/>
+                <c:pt idx="0">
+                  <c:v>Series 1</c:v>
+                </c:pt>
+              </c:strCache>
+            </c:strRef>
+          </c:tx>
+          <c:invertIfNegative val="0"/>
+          <c:cat>
+            <c:strRef>
+              <c:f>Sheet1!$A$2:$A$5</c:f>
+              <c:strCache>
+                <c:ptCount val="4"/>
+                <c:pt idx="0">
+                  <c:v>Category 1</c:v>
+                </c:pt>
+                <c:pt idx="1">
+                  <c:v>Category 2</c:v>
+                </c:pt>
+                <c:pt idx="2">
+                  <c:v>Category 3</c:v>
+                </c:pt>
+                <c:pt idx="3">
+                  <c:v>Category 4</c:v>
+                </c:pt>
+              </c:strCache>
+            </c:strRef>
+          </c:cat>
+          <c:val>
+            <c:numRef>
+              <c:f>Sheet1!$B$2:$B$5</c:f>
+              <c:numCache>
+                <c:formatCode>General</c:formatCode>
+                <c:ptCount val="4"/>
+                <c:pt idx="0">
+                  <c:v>4.3</c:v>
+                </c:pt>
+                <c:pt idx="1">
+                  <c:v>2.5</c:v>
+                </c:pt>
+                <c:pt idx="2">
+                  <c:v>3.5</c:v>
+                </c:pt>
+                <c:pt idx="3">
+                  <c:v>4.5</c:v>
+                </c:pt>
+              </c:numCache>
+            </c:numRef>
+          </c:val>
+        </c:ser>
+        <c:ser>
+          <c:idx val="1"/>
+          <c:order val="1"/>
+          <c:tx>
+            <c:strRef>
+              <c:f>Sheet1!$C$1</c:f>
+              <c:strCache>
+                <c:ptCount val="1"/>
+                <c:pt idx="0">
+                  <c:v>Series 2</c:v>
+                </c:pt>
+              </c:strCache>
+            </c:strRef>
+          </c:tx>
+          <c:invertIfNegative val="0"/>
+          <c:cat>
+            <c:strRef>
+              <c:f>Sheet1!$A$2:$A$5</c:f>
+              <c:strCache>
+                <c:ptCount val="4"/>
+                <c:pt idx="0">
+                  <c:v>Category 1</c:v>
+                </c:pt>
+                <c:pt idx="1">
+                  <c:v>Category 2</c:v>
+                </c:pt>
+                <c:pt idx="2">
+                  <c:v>Category 3</c:v>
+                </c:pt>
+                <c:pt idx="3">
+                  <c:v>Category 4</c:v>
+                </c:pt>
+              </c:strCache>
+            </c:strRef>
+          </c:cat>
+          <c:val>
+            <c:numRef>
+              <c:f>Sheet1!$C$2:$C$5</c:f>
+              <c:numCache>
+                <c:formatCode>General</c:formatCode>
+                <c:ptCount val="4"/>
+                <c:pt idx="0">
+                  <c:v>2.4</c:v>
+                </c:pt>
+                <c:pt idx="1">
+                  <c:v>4.4</c:v>
+                </c:pt>
+                <c:pt idx="2">
+                  <c:v>1.8</c:v>
+                </c:pt>
+                <c:pt idx="3">
+                  <c:v>2.8</c:v>
+                </c:pt>
+              </c:numCache>
+            </c:numRef>
+          </c:val>
+        </c:ser>
+        <c:ser>
+          <c:idx val="2"/>
+          <c:order val="2"/>
+          <c:tx>
+            <c:strRef>
+              <c:f>Sheet1!$D$1</c:f>
+              <c:strCache>
+                <c:ptCount val="1"/>
+                <c:pt idx="0">
+                  <c:v>Series 3</c:v>
+                </c:pt>
+              </c:strCache>
+            </c:strRef>
+          </c:tx>
+          <c:invertIfNegative val="0"/>
+          <c:cat>
+            <c:strRef>
+              <c:f>Sheet1!$A$2:$A$5</c:f>
+              <c:strCache>
+                <c:ptCount val="4"/>
+                <c:pt idx="0">
+                  <c:v>Category 1</c:v>
+                </c:pt>
+                <c:pt idx="1">
+                  <c:v>Category 2</c:v>
+                </c:pt>
+                <c:pt idx="2">
+                  <c:v>Category 3</c:v>
+                </c:pt>
+                <c:pt idx="3">
+                  <c:v>Category 4</c:v>
+                </c:pt>
+              </c:strCache>
+            </c:strRef>
+          </c:cat>
+          <c:val>
+            <c:numRef>
+              <c:f>Sheet1!$D$2:$D$5</c:f>
+              <c:numCache>
+                <c:formatCode>General</c:formatCode>
+                <c:ptCount val="4"/>
+                <c:pt idx="0">
+                  <c:v>2.0</c:v>
+                </c:pt>
+                <c:pt idx="1">
+                  <c:v>2.0</c:v>
+                </c:pt>
+                <c:pt idx="2">
+                  <c:v>3.0</c:v>
+                </c:pt>
+                <c:pt idx="3">
+                  <c:v>5.0</c:v>
+                </c:pt>
+              </c:numCache>
+            </c:numRef>
+          </c:val>
+        </c:ser>
+        <c:dLbls>
+          <c:showLegendKey val="0"/>
+          <c:showVal val="0"/>
+          <c:showCatName val="0"/>
+          <c:showSerName val="0"/>
+          <c:showPercent val="0"/>
+          <c:showBubbleSize val="0"/>
+        </c:dLbls>
+        <c:gapWidth val="150"/>
+        <c:axId val="2067994824"/>
+        <c:axId val="-2074751000"/>
+      </c:barChart>
+      <c:catAx>
+        <c:axId val="2067994824"/>
+        <c:scaling>
+          <c:orientation val="minMax"/>
+        </c:scaling>
+        <c:delete val="0"/>
+        <c:axPos val="l"/>
+        <c:majorTickMark val="out"/>
+        <c:minorTickMark val="none"/>
+        <c:tickLblPos val="nextTo"/>
+        <c:crossAx val="-2074751000"/>
+        <c:crosses val="autoZero"/>
+        <c:auto val="1"/>
+        <c:lblAlgn val="ctr"/>
+        <c:lblOffset val="100"/>
+        <c:noMultiLvlLbl val="0"/>
+      </c:catAx>
+      <c:valAx>
+        <c:axId val="-2074751000"/>
+        <c:scaling>
+          <c:orientation val="minMax"/>
+        </c:scaling>
+        <c:delete val="0"/>
+        <c:axPos val="b"/>
+        <c:majorGridlines/>
+        <c:numFmt formatCode="General" sourceLinked="1"/>
+        <c:majorTickMark val="out"/>
+        <c:minorTickMark val="none"/>
+        <c:tickLblPos val="nextTo"/>
+        <c:crossAx val="2067994824"/>
+        <c:crosses val="autoZero"/>
+        <c:crossBetween val="between"/>
+      </c:valAx>
+    </c:plotArea>
+    <c:legend>
+      <c:legendPos val="r"/>
+      <c:layout/>
+      <c:overlay val="0"/>
+    </c:legend>
+    <c:plotVisOnly val="1"/>
+    <c:dispBlanksAs val="gap"/>
+    <c:showDLblsOverMax val="0"/>
+  </c:chart>
+  <c:txPr>
+    <a:bodyPr/>
+    <a:lstStyle/>
+    <a:p>
+      <a:pPr>
+        <a:defRPr sz="1800"/>
+      </a:pPr>
+      <a:endParaRPr lang="en-US"/>
+    </a:p>
+  </c:txPr>
+  <c:externalData r:id="rId1">
+    <c:autoUpdate val="0"/>
+  </c:externalData>
+</c:chartSpace>
 </file>
 
 <file path=ppt/slideLayouts/slideLayout1.xml><?xml version="1.0" encoding="utf-8"?>
@@ -3275,846 +3538,7 @@
           </a:p>
         </p:txBody>
       </p:sp>
-      <p:sp>
-        <p:nvSpPr>
-          <p:cNvPr id="5" name="Oval 4"/>
-          <p:cNvSpPr/>
-          <p:nvPr/>
-        </p:nvSpPr>
-        <p:spPr>
-          <a:xfrm>
-            <a:off x="7264357" y="4857371"/>
-            <a:ext cx="914400" cy="914400"/>
-          </a:xfrm>
-          <a:prstGeom prst="ellipse">
-            <a:avLst/>
-          </a:prstGeom>
-        </p:spPr>
-        <p:style>
-          <a:lnRef idx="1">
-            <a:schemeClr val="accent1"/>
-          </a:lnRef>
-          <a:fillRef idx="3">
-            <a:schemeClr val="accent1"/>
-          </a:fillRef>
-          <a:effectRef idx="2">
-            <a:schemeClr val="accent1"/>
-          </a:effectRef>
-          <a:fontRef idx="minor">
-            <a:schemeClr val="lt1"/>
-          </a:fontRef>
-        </p:style>
-        <p:txBody>
-          <a:bodyPr rtlCol="0" anchor="ctr"/>
-          <a:lstStyle/>
-          <a:p>
-            <a:pPr algn="ctr"/>
-            <a:r>
-              <a:rPr lang="en-US" dirty="0" smtClean="0"/>
-              <a:t>0</a:t>
-            </a:r>
-            <a:endParaRPr lang="en-US" dirty="0"/>
-          </a:p>
-        </p:txBody>
-      </p:sp>
-      <p:sp>
-        <p:nvSpPr>
-          <p:cNvPr id="5" name="Oval 4"/>
-          <p:cNvSpPr/>
-          <p:nvPr/>
-        </p:nvSpPr>
-        <p:spPr>
-          <a:xfrm>
-            <a:off x="1271728" y="2454883"/>
-            <a:ext cx="914400" cy="914400"/>
-          </a:xfrm>
-          <a:prstGeom prst="ellipse">
-            <a:avLst/>
-          </a:prstGeom>
-        </p:spPr>
-        <p:style>
-          <a:lnRef idx="1">
-            <a:schemeClr val="accent1"/>
-          </a:lnRef>
-          <a:fillRef idx="3">
-            <a:schemeClr val="accent1"/>
-          </a:fillRef>
-          <a:effectRef idx="2">
-            <a:schemeClr val="accent1"/>
-          </a:effectRef>
-          <a:fontRef idx="minor">
-            <a:schemeClr val="lt1"/>
-          </a:fontRef>
-        </p:style>
-        <p:txBody>
-          <a:bodyPr rtlCol="0" anchor="ctr"/>
-          <a:lstStyle/>
-          <a:p>
-            <a:pPr algn="ctr"/>
-            <a:r>
-              <a:rPr lang="en-US" dirty="0" smtClean="0"/>
-              <a:t>1</a:t>
-            </a:r>
-            <a:endParaRPr lang="en-US" dirty="0"/>
-          </a:p>
-        </p:txBody>
-      </p:sp>
-      <p:sp>
-        <p:nvSpPr>
-          <p:cNvPr id="5" name="Oval 4"/>
-          <p:cNvSpPr/>
-          <p:nvPr/>
-        </p:nvSpPr>
-        <p:spPr>
-          <a:xfrm>
-            <a:off x="2463632" y="1742079"/>
-            <a:ext cx="914400" cy="914400"/>
-          </a:xfrm>
-          <a:prstGeom prst="ellipse">
-            <a:avLst/>
-          </a:prstGeom>
-        </p:spPr>
-        <p:style>
-          <a:lnRef idx="1">
-            <a:schemeClr val="accent1"/>
-          </a:lnRef>
-          <a:fillRef idx="3">
-            <a:schemeClr val="accent1"/>
-          </a:fillRef>
-          <a:effectRef idx="2">
-            <a:schemeClr val="accent1"/>
-          </a:effectRef>
-          <a:fontRef idx="minor">
-            <a:schemeClr val="lt1"/>
-          </a:fontRef>
-        </p:style>
-        <p:txBody>
-          <a:bodyPr rtlCol="0" anchor="ctr"/>
-          <a:lstStyle/>
-          <a:p>
-            <a:pPr algn="ctr"/>
-            <a:r>
-              <a:rPr lang="en-US" dirty="0" smtClean="0"/>
-              <a:t>2</a:t>
-            </a:r>
-            <a:endParaRPr lang="en-US" dirty="0"/>
-          </a:p>
-        </p:txBody>
-      </p:sp>
-      <p:sp>
-        <p:nvSpPr>
-          <p:cNvPr id="5" name="Oval 4"/>
-          <p:cNvSpPr/>
-          <p:nvPr/>
-        </p:nvSpPr>
-        <p:spPr>
-          <a:xfrm>
-            <a:off x="1103396" y="151198"/>
-            <a:ext cx="914400" cy="914400"/>
-          </a:xfrm>
-          <a:prstGeom prst="ellipse">
-            <a:avLst/>
-          </a:prstGeom>
-        </p:spPr>
-        <p:style>
-          <a:lnRef idx="1">
-            <a:schemeClr val="accent1"/>
-          </a:lnRef>
-          <a:fillRef idx="3">
-            <a:schemeClr val="accent1"/>
-          </a:fillRef>
-          <a:effectRef idx="2">
-            <a:schemeClr val="accent1"/>
-          </a:effectRef>
-          <a:fontRef idx="minor">
-            <a:schemeClr val="lt1"/>
-          </a:fontRef>
-        </p:style>
-        <p:txBody>
-          <a:bodyPr rtlCol="0" anchor="ctr"/>
-          <a:lstStyle/>
-          <a:p>
-            <a:pPr algn="ctr"/>
-            <a:r>
-              <a:rPr lang="en-US" dirty="0" smtClean="0"/>
-              <a:t>3</a:t>
-            </a:r>
-            <a:endParaRPr lang="en-US" dirty="0"/>
-          </a:p>
-        </p:txBody>
-      </p:sp>
-      <p:sp>
-        <p:nvSpPr>
-          <p:cNvPr id="5" name="Oval 4"/>
-          <p:cNvSpPr/>
-          <p:nvPr/>
-        </p:nvSpPr>
-        <p:spPr>
-          <a:xfrm>
-            <a:off x="5390691" y="2014707"/>
-            <a:ext cx="914400" cy="914400"/>
-          </a:xfrm>
-          <a:prstGeom prst="ellipse">
-            <a:avLst/>
-          </a:prstGeom>
-        </p:spPr>
-        <p:style>
-          <a:lnRef idx="1">
-            <a:schemeClr val="accent1"/>
-          </a:lnRef>
-          <a:fillRef idx="3">
-            <a:schemeClr val="accent1"/>
-          </a:fillRef>
-          <a:effectRef idx="2">
-            <a:schemeClr val="accent1"/>
-          </a:effectRef>
-          <a:fontRef idx="minor">
-            <a:schemeClr val="lt1"/>
-          </a:fontRef>
-        </p:style>
-        <p:txBody>
-          <a:bodyPr rtlCol="0" anchor="ctr"/>
-          <a:lstStyle/>
-          <a:p>
-            <a:pPr algn="ctr"/>
-            <a:r>
-              <a:rPr lang="en-US" dirty="0" smtClean="0"/>
-              <a:t>4</a:t>
-            </a:r>
-            <a:endParaRPr lang="en-US" dirty="0"/>
-          </a:p>
-        </p:txBody>
-      </p:sp>
-      <p:sp>
-        <p:nvSpPr>
-          <p:cNvPr id="5" name="Oval 4"/>
-          <p:cNvSpPr/>
-          <p:nvPr/>
-        </p:nvSpPr>
-        <p:spPr>
-          <a:xfrm>
-            <a:off x="3101711" y="1956626"/>
-            <a:ext cx="914400" cy="914400"/>
-          </a:xfrm>
-          <a:prstGeom prst="ellipse">
-            <a:avLst/>
-          </a:prstGeom>
-        </p:spPr>
-        <p:style>
-          <a:lnRef idx="1">
-            <a:schemeClr val="accent1"/>
-          </a:lnRef>
-          <a:fillRef idx="3">
-            <a:schemeClr val="accent1"/>
-          </a:fillRef>
-          <a:effectRef idx="2">
-            <a:schemeClr val="accent1"/>
-          </a:effectRef>
-          <a:fontRef idx="minor">
-            <a:schemeClr val="lt1"/>
-          </a:fontRef>
-        </p:style>
-        <p:txBody>
-          <a:bodyPr rtlCol="0" anchor="ctr"/>
-          <a:lstStyle/>
-          <a:p>
-            <a:pPr algn="ctr"/>
-            <a:r>
-              <a:rPr lang="en-US" dirty="0" smtClean="0"/>
-              <a:t>5</a:t>
-            </a:r>
-            <a:endParaRPr lang="en-US" dirty="0"/>
-          </a:p>
-        </p:txBody>
-      </p:sp>
-      <p:sp>
-        <p:nvSpPr>
-          <p:cNvPr id="5" name="Oval 4"/>
-          <p:cNvSpPr/>
-          <p:nvPr/>
-        </p:nvSpPr>
-        <p:spPr>
-          <a:xfrm>
-            <a:off x="7001157" y="5062330"/>
-            <a:ext cx="914400" cy="914400"/>
-          </a:xfrm>
-          <a:prstGeom prst="ellipse">
-            <a:avLst/>
-          </a:prstGeom>
-        </p:spPr>
-        <p:style>
-          <a:lnRef idx="1">
-            <a:schemeClr val="accent1"/>
-          </a:lnRef>
-          <a:fillRef idx="3">
-            <a:schemeClr val="accent1"/>
-          </a:fillRef>
-          <a:effectRef idx="2">
-            <a:schemeClr val="accent1"/>
-          </a:effectRef>
-          <a:fontRef idx="minor">
-            <a:schemeClr val="lt1"/>
-          </a:fontRef>
-        </p:style>
-        <p:txBody>
-          <a:bodyPr rtlCol="0" anchor="ctr"/>
-          <a:lstStyle/>
-          <a:p>
-            <a:pPr algn="ctr"/>
-            <a:r>
-              <a:rPr lang="en-US" dirty="0" smtClean="0"/>
-              <a:t>6</a:t>
-            </a:r>
-            <a:endParaRPr lang="en-US" dirty="0"/>
-          </a:p>
-        </p:txBody>
-      </p:sp>
-      <p:sp>
-        <p:nvSpPr>
-          <p:cNvPr id="5" name="Oval 4"/>
-          <p:cNvSpPr/>
-          <p:nvPr/>
-        </p:nvSpPr>
-        <p:spPr>
-          <a:xfrm>
-            <a:off x="6326151" y="717335"/>
-            <a:ext cx="914400" cy="914400"/>
-          </a:xfrm>
-          <a:prstGeom prst="ellipse">
-            <a:avLst/>
-          </a:prstGeom>
-        </p:spPr>
-        <p:style>
-          <a:lnRef idx="1">
-            <a:schemeClr val="accent1"/>
-          </a:lnRef>
-          <a:fillRef idx="3">
-            <a:schemeClr val="accent1"/>
-          </a:fillRef>
-          <a:effectRef idx="2">
-            <a:schemeClr val="accent1"/>
-          </a:effectRef>
-          <a:fontRef idx="minor">
-            <a:schemeClr val="lt1"/>
-          </a:fontRef>
-        </p:style>
-        <p:txBody>
-          <a:bodyPr rtlCol="0" anchor="ctr"/>
-          <a:lstStyle/>
-          <a:p>
-            <a:pPr algn="ctr"/>
-            <a:r>
-              <a:rPr lang="en-US" dirty="0" smtClean="0"/>
-              <a:t>7</a:t>
-            </a:r>
-            <a:endParaRPr lang="en-US" dirty="0"/>
-          </a:p>
-        </p:txBody>
-      </p:sp>
-      <p:sp>
-        <p:nvSpPr>
-          <p:cNvPr id="5" name="Oval 4"/>
-          <p:cNvSpPr/>
-          <p:nvPr/>
-        </p:nvSpPr>
-        <p:spPr>
-          <a:xfrm>
-            <a:off x="1423495" y="3277611"/>
-            <a:ext cx="914400" cy="914400"/>
-          </a:xfrm>
-          <a:prstGeom prst="ellipse">
-            <a:avLst/>
-          </a:prstGeom>
-        </p:spPr>
-        <p:style>
-          <a:lnRef idx="1">
-            <a:schemeClr val="accent1"/>
-          </a:lnRef>
-          <a:fillRef idx="3">
-            <a:schemeClr val="accent1"/>
-          </a:fillRef>
-          <a:effectRef idx="2">
-            <a:schemeClr val="accent1"/>
-          </a:effectRef>
-          <a:fontRef idx="minor">
-            <a:schemeClr val="lt1"/>
-          </a:fontRef>
-        </p:style>
-        <p:txBody>
-          <a:bodyPr rtlCol="0" anchor="ctr"/>
-          <a:lstStyle/>
-          <a:p>
-            <a:pPr algn="ctr"/>
-            <a:r>
-              <a:rPr lang="en-US" dirty="0" smtClean="0"/>
-              <a:t>8</a:t>
-            </a:r>
-            <a:endParaRPr lang="en-US" dirty="0"/>
-          </a:p>
-        </p:txBody>
-      </p:sp>
-      <p:sp>
-        <p:nvSpPr>
-          <p:cNvPr id="5" name="Oval 4"/>
-          <p:cNvSpPr/>
-          <p:nvPr/>
-        </p:nvSpPr>
-        <p:spPr>
-          <a:xfrm>
-            <a:off x="2524185" y="2023902"/>
-            <a:ext cx="914400" cy="914400"/>
-          </a:xfrm>
-          <a:prstGeom prst="ellipse">
-            <a:avLst/>
-          </a:prstGeom>
-        </p:spPr>
-        <p:style>
-          <a:lnRef idx="1">
-            <a:schemeClr val="accent1"/>
-          </a:lnRef>
-          <a:fillRef idx="3">
-            <a:schemeClr val="accent1"/>
-          </a:fillRef>
-          <a:effectRef idx="2">
-            <a:schemeClr val="accent1"/>
-          </a:effectRef>
-          <a:fontRef idx="minor">
-            <a:schemeClr val="lt1"/>
-          </a:fontRef>
-        </p:style>
-        <p:txBody>
-          <a:bodyPr rtlCol="0" anchor="ctr"/>
-          <a:lstStyle/>
-          <a:p>
-            <a:pPr algn="ctr"/>
-            <a:r>
-              <a:rPr lang="en-US" dirty="0" smtClean="0"/>
-              <a:t>9</a:t>
-            </a:r>
-            <a:endParaRPr lang="en-US" dirty="0"/>
-          </a:p>
-        </p:txBody>
-      </p:sp>
-      <p:sp>
-        <p:nvSpPr>
-          <p:cNvPr id="5" name="Oval 4"/>
-          <p:cNvSpPr/>
-          <p:nvPr/>
-        </p:nvSpPr>
-        <p:spPr>
-          <a:xfrm>
-            <a:off x="5885083" y="3369368"/>
-            <a:ext cx="914400" cy="914400"/>
-          </a:xfrm>
-          <a:prstGeom prst="ellipse">
-            <a:avLst/>
-          </a:prstGeom>
-        </p:spPr>
-        <p:style>
-          <a:lnRef idx="1">
-            <a:schemeClr val="accent1"/>
-          </a:lnRef>
-          <a:fillRef idx="3">
-            <a:schemeClr val="accent1"/>
-          </a:fillRef>
-          <a:effectRef idx="2">
-            <a:schemeClr val="accent1"/>
-          </a:effectRef>
-          <a:fontRef idx="minor">
-            <a:schemeClr val="lt1"/>
-          </a:fontRef>
-        </p:style>
-        <p:txBody>
-          <a:bodyPr rtlCol="0" anchor="ctr"/>
-          <a:lstStyle/>
-          <a:p>
-            <a:pPr algn="ctr"/>
-            <a:r>
-              <a:rPr lang="en-US" dirty="0" smtClean="0"/>
-              <a:t>10</a:t>
-            </a:r>
-            <a:endParaRPr lang="en-US" dirty="0"/>
-          </a:p>
-        </p:txBody>
-      </p:sp>
-      <p:sp>
-        <p:nvSpPr>
-          <p:cNvPr id="5" name="Oval 4"/>
-          <p:cNvSpPr/>
-          <p:nvPr/>
-        </p:nvSpPr>
-        <p:spPr>
-          <a:xfrm>
-            <a:off x="27828" y="3605597"/>
-            <a:ext cx="914400" cy="914400"/>
-          </a:xfrm>
-          <a:prstGeom prst="ellipse">
-            <a:avLst/>
-          </a:prstGeom>
-        </p:spPr>
-        <p:style>
-          <a:lnRef idx="1">
-            <a:schemeClr val="accent1"/>
-          </a:lnRef>
-          <a:fillRef idx="3">
-            <a:schemeClr val="accent1"/>
-          </a:fillRef>
-          <a:effectRef idx="2">
-            <a:schemeClr val="accent1"/>
-          </a:effectRef>
-          <a:fontRef idx="minor">
-            <a:schemeClr val="lt1"/>
-          </a:fontRef>
-        </p:style>
-        <p:txBody>
-          <a:bodyPr rtlCol="0" anchor="ctr"/>
-          <a:lstStyle/>
-          <a:p>
-            <a:pPr algn="ctr"/>
-            <a:r>
-              <a:rPr lang="en-US" dirty="0" smtClean="0"/>
-              <a:t>11</a:t>
-            </a:r>
-            <a:endParaRPr lang="en-US" dirty="0"/>
-          </a:p>
-        </p:txBody>
-      </p:sp>
-      <p:sp>
-        <p:nvSpPr>
-          <p:cNvPr id="5" name="Oval 4"/>
-          <p:cNvSpPr/>
-          <p:nvPr/>
-        </p:nvSpPr>
-        <p:spPr>
-          <a:xfrm>
-            <a:off x="6084034" y="101518"/>
-            <a:ext cx="914400" cy="914400"/>
-          </a:xfrm>
-          <a:prstGeom prst="ellipse">
-            <a:avLst/>
-          </a:prstGeom>
-        </p:spPr>
-        <p:style>
-          <a:lnRef idx="1">
-            <a:schemeClr val="accent1"/>
-          </a:lnRef>
-          <a:fillRef idx="3">
-            <a:schemeClr val="accent1"/>
-          </a:fillRef>
-          <a:effectRef idx="2">
-            <a:schemeClr val="accent1"/>
-          </a:effectRef>
-          <a:fontRef idx="minor">
-            <a:schemeClr val="lt1"/>
-          </a:fontRef>
-        </p:style>
-        <p:txBody>
-          <a:bodyPr rtlCol="0" anchor="ctr"/>
-          <a:lstStyle/>
-          <a:p>
-            <a:pPr algn="ctr"/>
-            <a:r>
-              <a:rPr lang="en-US" dirty="0" smtClean="0"/>
-              <a:t>12</a:t>
-            </a:r>
-            <a:endParaRPr lang="en-US" dirty="0"/>
-          </a:p>
-        </p:txBody>
-      </p:sp>
-      <p:sp>
-        <p:nvSpPr>
-          <p:cNvPr id="5" name="Oval 4"/>
-          <p:cNvSpPr/>
-          <p:nvPr/>
-        </p:nvSpPr>
-        <p:spPr>
-          <a:xfrm>
-            <a:off x="1097554" y="1281567"/>
-            <a:ext cx="914400" cy="914400"/>
-          </a:xfrm>
-          <a:prstGeom prst="ellipse">
-            <a:avLst/>
-          </a:prstGeom>
-        </p:spPr>
-        <p:style>
-          <a:lnRef idx="1">
-            <a:schemeClr val="accent1"/>
-          </a:lnRef>
-          <a:fillRef idx="3">
-            <a:schemeClr val="accent1"/>
-          </a:fillRef>
-          <a:effectRef idx="2">
-            <a:schemeClr val="accent1"/>
-          </a:effectRef>
-          <a:fontRef idx="minor">
-            <a:schemeClr val="lt1"/>
-          </a:fontRef>
-        </p:style>
-        <p:txBody>
-          <a:bodyPr rtlCol="0" anchor="ctr"/>
-          <a:lstStyle/>
-          <a:p>
-            <a:pPr algn="ctr"/>
-            <a:r>
-              <a:rPr lang="en-US" dirty="0" smtClean="0"/>
-              <a:t>13</a:t>
-            </a:r>
-            <a:endParaRPr lang="en-US" dirty="0"/>
-          </a:p>
-        </p:txBody>
-      </p:sp>
-      <p:sp>
-        <p:nvSpPr>
-          <p:cNvPr id="5" name="Oval 4"/>
-          <p:cNvSpPr/>
-          <p:nvPr/>
-        </p:nvSpPr>
-        <p:spPr>
-          <a:xfrm>
-            <a:off x="2459788" y="2473406"/>
-            <a:ext cx="914400" cy="914400"/>
-          </a:xfrm>
-          <a:prstGeom prst="ellipse">
-            <a:avLst/>
-          </a:prstGeom>
-        </p:spPr>
-        <p:style>
-          <a:lnRef idx="1">
-            <a:schemeClr val="accent1"/>
-          </a:lnRef>
-          <a:fillRef idx="3">
-            <a:schemeClr val="accent1"/>
-          </a:fillRef>
-          <a:effectRef idx="2">
-            <a:schemeClr val="accent1"/>
-          </a:effectRef>
-          <a:fontRef idx="minor">
-            <a:schemeClr val="lt1"/>
-          </a:fontRef>
-        </p:style>
-        <p:txBody>
-          <a:bodyPr rtlCol="0" anchor="ctr"/>
-          <a:lstStyle/>
-          <a:p>
-            <a:pPr algn="ctr"/>
-            <a:r>
-              <a:rPr lang="en-US" dirty="0" smtClean="0"/>
-              <a:t>14</a:t>
-            </a:r>
-            <a:endParaRPr lang="en-US" dirty="0"/>
-          </a:p>
-        </p:txBody>
-      </p:sp>
-      <p:sp>
-        <p:nvSpPr>
-          <p:cNvPr id="5" name="Oval 4"/>
-          <p:cNvSpPr/>
-          <p:nvPr/>
-        </p:nvSpPr>
-        <p:spPr>
-          <a:xfrm>
-            <a:off x="8464860" y="4450443"/>
-            <a:ext cx="914400" cy="914400"/>
-          </a:xfrm>
-          <a:prstGeom prst="ellipse">
-            <a:avLst/>
-          </a:prstGeom>
-        </p:spPr>
-        <p:style>
-          <a:lnRef idx="1">
-            <a:schemeClr val="accent1"/>
-          </a:lnRef>
-          <a:fillRef idx="3">
-            <a:schemeClr val="accent1"/>
-          </a:fillRef>
-          <a:effectRef idx="2">
-            <a:schemeClr val="accent1"/>
-          </a:effectRef>
-          <a:fontRef idx="minor">
-            <a:schemeClr val="lt1"/>
-          </a:fontRef>
-        </p:style>
-        <p:txBody>
-          <a:bodyPr rtlCol="0" anchor="ctr"/>
-          <a:lstStyle/>
-          <a:p>
-            <a:pPr algn="ctr"/>
-            <a:r>
-              <a:rPr lang="en-US" dirty="0" smtClean="0"/>
-              <a:t>15</a:t>
-            </a:r>
-            <a:endParaRPr lang="en-US" dirty="0"/>
-          </a:p>
-        </p:txBody>
-      </p:sp>
-      <p:sp>
-        <p:nvSpPr>
-          <p:cNvPr id="5" name="Oval 4"/>
-          <p:cNvSpPr/>
-          <p:nvPr/>
-        </p:nvSpPr>
-        <p:spPr>
-          <a:xfrm>
-            <a:off x="7433469" y="4640059"/>
-            <a:ext cx="914400" cy="914400"/>
-          </a:xfrm>
-          <a:prstGeom prst="ellipse">
-            <a:avLst/>
-          </a:prstGeom>
-        </p:spPr>
-        <p:style>
-          <a:lnRef idx="1">
-            <a:schemeClr val="accent1"/>
-          </a:lnRef>
-          <a:fillRef idx="3">
-            <a:schemeClr val="accent1"/>
-          </a:fillRef>
-          <a:effectRef idx="2">
-            <a:schemeClr val="accent1"/>
-          </a:effectRef>
-          <a:fontRef idx="minor">
-            <a:schemeClr val="lt1"/>
-          </a:fontRef>
-        </p:style>
-        <p:txBody>
-          <a:bodyPr rtlCol="0" anchor="ctr"/>
-          <a:lstStyle/>
-          <a:p>
-            <a:pPr algn="ctr"/>
-            <a:r>
-              <a:rPr lang="en-US" dirty="0" smtClean="0"/>
-              <a:t>16</a:t>
-            </a:r>
-            <a:endParaRPr lang="en-US" dirty="0"/>
-          </a:p>
-        </p:txBody>
-      </p:sp>
-      <p:sp>
-        <p:nvSpPr>
-          <p:cNvPr id="5" name="Oval 4"/>
-          <p:cNvSpPr/>
-          <p:nvPr/>
-        </p:nvSpPr>
-        <p:spPr>
-          <a:xfrm>
-            <a:off x="2903341" y="13900"/>
-            <a:ext cx="914400" cy="914400"/>
-          </a:xfrm>
-          <a:prstGeom prst="ellipse">
-            <a:avLst/>
-          </a:prstGeom>
-        </p:spPr>
-        <p:style>
-          <a:lnRef idx="1">
-            <a:schemeClr val="accent1"/>
-          </a:lnRef>
-          <a:fillRef idx="3">
-            <a:schemeClr val="accent1"/>
-          </a:fillRef>
-          <a:effectRef idx="2">
-            <a:schemeClr val="accent1"/>
-          </a:effectRef>
-          <a:fontRef idx="minor">
-            <a:schemeClr val="lt1"/>
-          </a:fontRef>
-        </p:style>
-        <p:txBody>
-          <a:bodyPr rtlCol="0" anchor="ctr"/>
-          <a:lstStyle/>
-          <a:p>
-            <a:pPr algn="ctr"/>
-            <a:r>
-              <a:rPr lang="en-US" dirty="0" smtClean="0"/>
-              <a:t>17</a:t>
-            </a:r>
-            <a:endParaRPr lang="en-US" dirty="0"/>
-          </a:p>
-        </p:txBody>
-      </p:sp>
-      <p:sp>
-        <p:nvSpPr>
-          <p:cNvPr id="5" name="Oval 4"/>
-          <p:cNvSpPr/>
-          <p:nvPr/>
-        </p:nvSpPr>
-        <p:spPr>
-          <a:xfrm>
-            <a:off x="3413387" y="808870"/>
-            <a:ext cx="914400" cy="914400"/>
-          </a:xfrm>
-          <a:prstGeom prst="ellipse">
-            <a:avLst/>
-          </a:prstGeom>
-        </p:spPr>
-        <p:style>
-          <a:lnRef idx="1">
-            <a:schemeClr val="accent1"/>
-          </a:lnRef>
-          <a:fillRef idx="3">
-            <a:schemeClr val="accent1"/>
-          </a:fillRef>
-          <a:effectRef idx="2">
-            <a:schemeClr val="accent1"/>
-          </a:effectRef>
-          <a:fontRef idx="minor">
-            <a:schemeClr val="lt1"/>
-          </a:fontRef>
-        </p:style>
-        <p:txBody>
-          <a:bodyPr rtlCol="0" anchor="ctr"/>
-          <a:lstStyle/>
-          <a:p>
-            <a:pPr algn="ctr"/>
-            <a:r>
-              <a:rPr lang="en-US" dirty="0" smtClean="0"/>
-              <a:t>18</a:t>
-            </a:r>
-            <a:endParaRPr lang="en-US" dirty="0"/>
-          </a:p>
-        </p:txBody>
-      </p:sp>
-      <p:sp>
-        <p:nvSpPr>
-          <p:cNvPr id="5" name="Oval 4"/>
-          <p:cNvSpPr/>
-          <p:nvPr/>
-        </p:nvSpPr>
-        <p:spPr>
-          <a:xfrm>
-            <a:off x="915791" y="5278234"/>
-            <a:ext cx="914400" cy="914400"/>
-          </a:xfrm>
-          <a:prstGeom prst="ellipse">
-            <a:avLst/>
-          </a:prstGeom>
-        </p:spPr>
-        <p:style>
-          <a:lnRef idx="1">
-            <a:schemeClr val="accent1"/>
-          </a:lnRef>
-          <a:fillRef idx="3">
-            <a:schemeClr val="accent1"/>
-          </a:fillRef>
-          <a:effectRef idx="2">
-            <a:schemeClr val="accent1"/>
-          </a:effectRef>
-          <a:fontRef idx="minor">
-            <a:schemeClr val="lt1"/>
-          </a:fontRef>
-        </p:style>
-        <p:txBody>
-          <a:bodyPr rtlCol="0" anchor="ctr"/>
-          <a:lstStyle/>
-          <a:p>
-            <a:pPr algn="ctr"/>
-            <a:r>
-              <a:rPr lang="en-US" dirty="0" smtClean="0"/>
-              <a:t>19</a:t>
-            </a:r>
-            <a:endParaRPr lang="en-US" dirty="0"/>
-          </a:p>
-        </p:txBody>
-      </p:sp>
+      <p:sp/>
     </p:spTree>
     <p:extLst>
       <p:ext uri="{BB962C8B-B14F-4D97-AF65-F5344CB8AC3E}">

</xml_diff>

<commit_message>
Abstract a bit more about chart and slide addition
</commit_message>
<xml_diff>
--- a/test/files/parts3-a.pptx
+++ b/test/files/parts3-a.pptx
@@ -3538,7 +3538,868 @@
           </a:p>
         </p:txBody>
       </p:sp>
-      <p:sp/>
+      <p:sp>
+        <p:nvSpPr>
+          <p:cNvPr id="5" name="Oval 4"/>
+          <p:cNvSpPr/>
+          <p:nvPr/>
+        </p:nvSpPr>
+        <p:spPr>
+          <a:xfrm>
+            <a:off x="4690240" y="3880161"/>
+            <a:ext cx="914400" cy="914400"/>
+          </a:xfrm>
+          <a:prstGeom prst="ellipse">
+            <a:avLst/>
+          </a:prstGeom>
+        </p:spPr>
+        <p:style>
+          <a:lnRef idx="1">
+            <a:schemeClr val="accent1"/>
+          </a:lnRef>
+          <a:fillRef idx="3">
+            <a:schemeClr val="accent1"/>
+          </a:fillRef>
+          <a:effectRef idx="2">
+            <a:schemeClr val="accent1"/>
+          </a:effectRef>
+          <a:fontRef idx="minor">
+            <a:schemeClr val="lt1"/>
+          </a:fontRef>
+        </p:style>
+        <p:txBody>
+          <a:bodyPr rtlCol="0" anchor="ctr"/>
+          <a:lstStyle/>
+          <a:p>
+            <a:pPr algn="ctr"/>
+            <a:r>
+              <a:rPr lang="en-US" dirty="0" smtClean="0"/>
+              <a:t>0</a:t>
+            </a:r>
+            <a:endParaRPr lang="en-US" dirty="0"/>
+          </a:p>
+        </p:txBody>
+      </p:sp>
+      <p:sp>
+        <p:nvSpPr>
+          <p:cNvPr id="5" name="Oval 4"/>
+          <p:cNvSpPr/>
+          <p:nvPr/>
+        </p:nvSpPr>
+        <p:spPr>
+          <a:xfrm>
+            <a:off x="3198099" y="651346"/>
+            <a:ext cx="914400" cy="914400"/>
+          </a:xfrm>
+          <a:prstGeom prst="ellipse">
+            <a:avLst/>
+          </a:prstGeom>
+        </p:spPr>
+        <p:style>
+          <a:lnRef idx="1">
+            <a:schemeClr val="accent1"/>
+          </a:lnRef>
+          <a:fillRef idx="3">
+            <a:schemeClr val="accent1"/>
+          </a:fillRef>
+          <a:effectRef idx="2">
+            <a:schemeClr val="accent1"/>
+          </a:effectRef>
+          <a:fontRef idx="minor">
+            <a:schemeClr val="lt1"/>
+          </a:fontRef>
+        </p:style>
+        <p:txBody>
+          <a:bodyPr rtlCol="0" anchor="ctr"/>
+          <a:lstStyle/>
+          <a:p>
+            <a:pPr algn="ctr"/>
+            <a:r>
+              <a:rPr lang="en-US" dirty="0" smtClean="0"/>
+              <a:t>1</a:t>
+            </a:r>
+            <a:endParaRPr lang="en-US" dirty="0"/>
+          </a:p>
+        </p:txBody>
+      </p:sp>
+      <p:sp>
+        <p:nvSpPr>
+          <p:cNvPr id="5" name="Oval 4"/>
+          <p:cNvSpPr/>
+          <p:nvPr/>
+        </p:nvSpPr>
+        <p:spPr>
+          <a:xfrm>
+            <a:off x="3173903" y="2410015"/>
+            <a:ext cx="914400" cy="914400"/>
+          </a:xfrm>
+          <a:prstGeom prst="ellipse">
+            <a:avLst/>
+          </a:prstGeom>
+        </p:spPr>
+        <p:style>
+          <a:lnRef idx="1">
+            <a:schemeClr val="accent1"/>
+          </a:lnRef>
+          <a:fillRef idx="3">
+            <a:schemeClr val="accent1"/>
+          </a:fillRef>
+          <a:effectRef idx="2">
+            <a:schemeClr val="accent1"/>
+          </a:effectRef>
+          <a:fontRef idx="minor">
+            <a:schemeClr val="lt1"/>
+          </a:fontRef>
+        </p:style>
+        <p:txBody>
+          <a:bodyPr rtlCol="0" anchor="ctr"/>
+          <a:lstStyle/>
+          <a:p>
+            <a:pPr algn="ctr"/>
+            <a:r>
+              <a:rPr lang="en-US" dirty="0" smtClean="0"/>
+              <a:t>2</a:t>
+            </a:r>
+            <a:endParaRPr lang="en-US" dirty="0"/>
+          </a:p>
+        </p:txBody>
+      </p:sp>
+      <p:sp>
+        <p:nvSpPr>
+          <p:cNvPr id="5" name="Oval 4"/>
+          <p:cNvSpPr/>
+          <p:nvPr/>
+        </p:nvSpPr>
+        <p:spPr>
+          <a:xfrm>
+            <a:off x="8026952" y="4711234"/>
+            <a:ext cx="914400" cy="914400"/>
+          </a:xfrm>
+          <a:prstGeom prst="ellipse">
+            <a:avLst/>
+          </a:prstGeom>
+        </p:spPr>
+        <p:style>
+          <a:lnRef idx="1">
+            <a:schemeClr val="accent1"/>
+          </a:lnRef>
+          <a:fillRef idx="3">
+            <a:schemeClr val="accent1"/>
+          </a:fillRef>
+          <a:effectRef idx="2">
+            <a:schemeClr val="accent1"/>
+          </a:effectRef>
+          <a:fontRef idx="minor">
+            <a:schemeClr val="lt1"/>
+          </a:fontRef>
+        </p:style>
+        <p:txBody>
+          <a:bodyPr rtlCol="0" anchor="ctr"/>
+          <a:lstStyle/>
+          <a:p>
+            <a:pPr algn="ctr"/>
+            <a:r>
+              <a:rPr lang="en-US" dirty="0" smtClean="0"/>
+              <a:t>3</a:t>
+            </a:r>
+            <a:endParaRPr lang="en-US" dirty="0"/>
+          </a:p>
+        </p:txBody>
+      </p:sp>
+      <p:sp>
+        <p:nvSpPr>
+          <p:cNvPr id="5" name="Oval 4"/>
+          <p:cNvSpPr/>
+          <p:nvPr/>
+        </p:nvSpPr>
+        <p:spPr>
+          <a:xfrm>
+            <a:off x="3071371" y="3895723"/>
+            <a:ext cx="914400" cy="914400"/>
+          </a:xfrm>
+          <a:prstGeom prst="ellipse">
+            <a:avLst/>
+          </a:prstGeom>
+        </p:spPr>
+        <p:style>
+          <a:lnRef idx="1">
+            <a:schemeClr val="accent1"/>
+          </a:lnRef>
+          <a:fillRef idx="3">
+            <a:schemeClr val="accent1"/>
+          </a:fillRef>
+          <a:effectRef idx="2">
+            <a:schemeClr val="accent1"/>
+          </a:effectRef>
+          <a:fontRef idx="minor">
+            <a:schemeClr val="lt1"/>
+          </a:fontRef>
+        </p:style>
+        <p:txBody>
+          <a:bodyPr rtlCol="0" anchor="ctr"/>
+          <a:lstStyle/>
+          <a:p>
+            <a:pPr algn="ctr"/>
+            <a:r>
+              <a:rPr lang="en-US" dirty="0" smtClean="0"/>
+              <a:t>4</a:t>
+            </a:r>
+            <a:endParaRPr lang="en-US" dirty="0"/>
+          </a:p>
+        </p:txBody>
+      </p:sp>
+      <p:sp>
+        <p:nvSpPr>
+          <p:cNvPr id="5" name="Oval 4"/>
+          <p:cNvSpPr/>
+          <p:nvPr/>
+        </p:nvSpPr>
+        <p:spPr>
+          <a:xfrm>
+            <a:off x="1477957" y="2744507"/>
+            <a:ext cx="914400" cy="914400"/>
+          </a:xfrm>
+          <a:prstGeom prst="ellipse">
+            <a:avLst/>
+          </a:prstGeom>
+        </p:spPr>
+        <p:style>
+          <a:lnRef idx="1">
+            <a:schemeClr val="accent1"/>
+          </a:lnRef>
+          <a:fillRef idx="3">
+            <a:schemeClr val="accent1"/>
+          </a:fillRef>
+          <a:effectRef idx="2">
+            <a:schemeClr val="accent1"/>
+          </a:effectRef>
+          <a:fontRef idx="minor">
+            <a:schemeClr val="lt1"/>
+          </a:fontRef>
+        </p:style>
+        <p:txBody>
+          <a:bodyPr rtlCol="0" anchor="ctr"/>
+          <a:lstStyle/>
+          <a:p>
+            <a:pPr algn="ctr"/>
+            <a:r>
+              <a:rPr lang="en-US" dirty="0" smtClean="0"/>
+              <a:t>5</a:t>
+            </a:r>
+            <a:endParaRPr lang="en-US" dirty="0"/>
+          </a:p>
+        </p:txBody>
+      </p:sp>
+      <p:sp>
+        <p:nvSpPr>
+          <p:cNvPr id="5" name="Oval 4"/>
+          <p:cNvSpPr/>
+          <p:nvPr/>
+        </p:nvSpPr>
+        <p:spPr>
+          <a:xfrm>
+            <a:off x="6651637" y="1262794"/>
+            <a:ext cx="914400" cy="914400"/>
+          </a:xfrm>
+          <a:prstGeom prst="ellipse">
+            <a:avLst/>
+          </a:prstGeom>
+        </p:spPr>
+        <p:style>
+          <a:lnRef idx="1">
+            <a:schemeClr val="accent1"/>
+          </a:lnRef>
+          <a:fillRef idx="3">
+            <a:schemeClr val="accent1"/>
+          </a:fillRef>
+          <a:effectRef idx="2">
+            <a:schemeClr val="accent1"/>
+          </a:effectRef>
+          <a:fontRef idx="minor">
+            <a:schemeClr val="lt1"/>
+          </a:fontRef>
+        </p:style>
+        <p:txBody>
+          <a:bodyPr rtlCol="0" anchor="ctr"/>
+          <a:lstStyle/>
+          <a:p>
+            <a:pPr algn="ctr"/>
+            <a:r>
+              <a:rPr lang="en-US" dirty="0" smtClean="0"/>
+              <a:t>6</a:t>
+            </a:r>
+            <a:endParaRPr lang="en-US" dirty="0"/>
+          </a:p>
+        </p:txBody>
+      </p:sp>
+      <p:sp>
+        <p:nvSpPr>
+          <p:cNvPr id="5" name="Oval 4"/>
+          <p:cNvSpPr/>
+          <p:nvPr/>
+        </p:nvSpPr>
+        <p:spPr>
+          <a:xfrm>
+            <a:off x="8977749" y="3874175"/>
+            <a:ext cx="914400" cy="914400"/>
+          </a:xfrm>
+          <a:prstGeom prst="ellipse">
+            <a:avLst/>
+          </a:prstGeom>
+        </p:spPr>
+        <p:style>
+          <a:lnRef idx="1">
+            <a:schemeClr val="accent1"/>
+          </a:lnRef>
+          <a:fillRef idx="3">
+            <a:schemeClr val="accent1"/>
+          </a:fillRef>
+          <a:effectRef idx="2">
+            <a:schemeClr val="accent1"/>
+          </a:effectRef>
+          <a:fontRef idx="minor">
+            <a:schemeClr val="lt1"/>
+          </a:fontRef>
+        </p:style>
+        <p:txBody>
+          <a:bodyPr rtlCol="0" anchor="ctr"/>
+          <a:lstStyle/>
+          <a:p>
+            <a:pPr algn="ctr"/>
+            <a:r>
+              <a:rPr lang="en-US" dirty="0" smtClean="0"/>
+              <a:t>7</a:t>
+            </a:r>
+            <a:endParaRPr lang="en-US" dirty="0"/>
+          </a:p>
+        </p:txBody>
+      </p:sp>
+      <p:sp>
+        <p:nvSpPr>
+          <p:cNvPr id="5" name="Oval 4"/>
+          <p:cNvSpPr/>
+          <p:nvPr/>
+        </p:nvSpPr>
+        <p:spPr>
+          <a:xfrm>
+            <a:off x="3704938" y="4425627"/>
+            <a:ext cx="914400" cy="914400"/>
+          </a:xfrm>
+          <a:prstGeom prst="ellipse">
+            <a:avLst/>
+          </a:prstGeom>
+        </p:spPr>
+        <p:style>
+          <a:lnRef idx="1">
+            <a:schemeClr val="accent1"/>
+          </a:lnRef>
+          <a:fillRef idx="3">
+            <a:schemeClr val="accent1"/>
+          </a:fillRef>
+          <a:effectRef idx="2">
+            <a:schemeClr val="accent1"/>
+          </a:effectRef>
+          <a:fontRef idx="minor">
+            <a:schemeClr val="lt1"/>
+          </a:fontRef>
+        </p:style>
+        <p:txBody>
+          <a:bodyPr rtlCol="0" anchor="ctr"/>
+          <a:lstStyle/>
+          <a:p>
+            <a:pPr algn="ctr"/>
+            <a:r>
+              <a:rPr lang="en-US" dirty="0" smtClean="0"/>
+              <a:t>8</a:t>
+            </a:r>
+            <a:endParaRPr lang="en-US" dirty="0"/>
+          </a:p>
+        </p:txBody>
+      </p:sp>
+      <p:sp>
+        <p:nvSpPr>
+          <p:cNvPr id="5" name="Oval 4"/>
+          <p:cNvSpPr/>
+          <p:nvPr/>
+        </p:nvSpPr>
+        <p:spPr>
+          <a:xfrm>
+            <a:off x="7837432" y="216830"/>
+            <a:ext cx="914400" cy="914400"/>
+          </a:xfrm>
+          <a:prstGeom prst="ellipse">
+            <a:avLst/>
+          </a:prstGeom>
+        </p:spPr>
+        <p:style>
+          <a:lnRef idx="1">
+            <a:schemeClr val="accent1"/>
+          </a:lnRef>
+          <a:fillRef idx="3">
+            <a:schemeClr val="accent1"/>
+          </a:fillRef>
+          <a:effectRef idx="2">
+            <a:schemeClr val="accent1"/>
+          </a:effectRef>
+          <a:fontRef idx="minor">
+            <a:schemeClr val="lt1"/>
+          </a:fontRef>
+        </p:style>
+        <p:txBody>
+          <a:bodyPr rtlCol="0" anchor="ctr"/>
+          <a:lstStyle/>
+          <a:p>
+            <a:pPr algn="ctr"/>
+            <a:r>
+              <a:rPr lang="en-US" dirty="0" smtClean="0"/>
+              <a:t>9</a:t>
+            </a:r>
+            <a:endParaRPr lang="en-US" dirty="0"/>
+          </a:p>
+        </p:txBody>
+      </p:sp>
+      <p:sp>
+        <p:nvSpPr>
+          <p:cNvPr id="5" name="Oval 4"/>
+          <p:cNvSpPr/>
+          <p:nvPr/>
+        </p:nvSpPr>
+        <p:spPr>
+          <a:xfrm>
+            <a:off x="3591484" y="5140679"/>
+            <a:ext cx="914400" cy="914400"/>
+          </a:xfrm>
+          <a:prstGeom prst="ellipse">
+            <a:avLst/>
+          </a:prstGeom>
+        </p:spPr>
+        <p:style>
+          <a:lnRef idx="1">
+            <a:schemeClr val="accent1"/>
+          </a:lnRef>
+          <a:fillRef idx="3">
+            <a:schemeClr val="accent1"/>
+          </a:fillRef>
+          <a:effectRef idx="2">
+            <a:schemeClr val="accent1"/>
+          </a:effectRef>
+          <a:fontRef idx="minor">
+            <a:schemeClr val="lt1"/>
+          </a:fontRef>
+        </p:style>
+        <p:txBody>
+          <a:bodyPr rtlCol="0" anchor="ctr"/>
+          <a:lstStyle/>
+          <a:p>
+            <a:pPr algn="ctr"/>
+            <a:r>
+              <a:rPr lang="en-US" dirty="0" smtClean="0"/>
+              <a:t>10</a:t>
+            </a:r>
+            <a:endParaRPr lang="en-US" dirty="0"/>
+          </a:p>
+        </p:txBody>
+      </p:sp>
+      <p:sp>
+        <p:nvSpPr>
+          <p:cNvPr id="5" name="Oval 4"/>
+          <p:cNvSpPr/>
+          <p:nvPr/>
+        </p:nvSpPr>
+        <p:spPr>
+          <a:xfrm>
+            <a:off x="5184558" y="4377945"/>
+            <a:ext cx="914400" cy="914400"/>
+          </a:xfrm>
+          <a:prstGeom prst="ellipse">
+            <a:avLst/>
+          </a:prstGeom>
+        </p:spPr>
+        <p:style>
+          <a:lnRef idx="1">
+            <a:schemeClr val="accent1"/>
+          </a:lnRef>
+          <a:fillRef idx="3">
+            <a:schemeClr val="accent1"/>
+          </a:fillRef>
+          <a:effectRef idx="2">
+            <a:schemeClr val="accent1"/>
+          </a:effectRef>
+          <a:fontRef idx="minor">
+            <a:schemeClr val="lt1"/>
+          </a:fontRef>
+        </p:style>
+        <p:txBody>
+          <a:bodyPr rtlCol="0" anchor="ctr"/>
+          <a:lstStyle/>
+          <a:p>
+            <a:pPr algn="ctr"/>
+            <a:r>
+              <a:rPr lang="en-US" dirty="0" smtClean="0"/>
+              <a:t>11</a:t>
+            </a:r>
+            <a:endParaRPr lang="en-US" dirty="0"/>
+          </a:p>
+        </p:txBody>
+      </p:sp>
+      <p:sp>
+        <p:nvSpPr>
+          <p:cNvPr id="5" name="Oval 4"/>
+          <p:cNvSpPr/>
+          <p:nvPr/>
+        </p:nvSpPr>
+        <p:spPr>
+          <a:xfrm>
+            <a:off x="2299361" y="5271145"/>
+            <a:ext cx="914400" cy="914400"/>
+          </a:xfrm>
+          <a:prstGeom prst="ellipse">
+            <a:avLst/>
+          </a:prstGeom>
+        </p:spPr>
+        <p:style>
+          <a:lnRef idx="1">
+            <a:schemeClr val="accent1"/>
+          </a:lnRef>
+          <a:fillRef idx="3">
+            <a:schemeClr val="accent1"/>
+          </a:fillRef>
+          <a:effectRef idx="2">
+            <a:schemeClr val="accent1"/>
+          </a:effectRef>
+          <a:fontRef idx="minor">
+            <a:schemeClr val="lt1"/>
+          </a:fontRef>
+        </p:style>
+        <p:txBody>
+          <a:bodyPr rtlCol="0" anchor="ctr"/>
+          <a:lstStyle/>
+          <a:p>
+            <a:pPr algn="ctr"/>
+            <a:r>
+              <a:rPr lang="en-US" dirty="0" smtClean="0"/>
+              <a:t>12</a:t>
+            </a:r>
+            <a:endParaRPr lang="en-US" dirty="0"/>
+          </a:p>
+        </p:txBody>
+      </p:sp>
+      <p:sp>
+        <p:nvSpPr>
+          <p:cNvPr id="5" name="Oval 4"/>
+          <p:cNvSpPr/>
+          <p:nvPr/>
+        </p:nvSpPr>
+        <p:spPr>
+          <a:xfrm>
+            <a:off x="8551041" y="1462140"/>
+            <a:ext cx="914400" cy="914400"/>
+          </a:xfrm>
+          <a:prstGeom prst="ellipse">
+            <a:avLst/>
+          </a:prstGeom>
+        </p:spPr>
+        <p:style>
+          <a:lnRef idx="1">
+            <a:schemeClr val="accent1"/>
+          </a:lnRef>
+          <a:fillRef idx="3">
+            <a:schemeClr val="accent1"/>
+          </a:fillRef>
+          <a:effectRef idx="2">
+            <a:schemeClr val="accent1"/>
+          </a:effectRef>
+          <a:fontRef idx="minor">
+            <a:schemeClr val="lt1"/>
+          </a:fontRef>
+        </p:style>
+        <p:txBody>
+          <a:bodyPr rtlCol="0" anchor="ctr"/>
+          <a:lstStyle/>
+          <a:p>
+            <a:pPr algn="ctr"/>
+            <a:r>
+              <a:rPr lang="en-US" dirty="0" smtClean="0"/>
+              <a:t>13</a:t>
+            </a:r>
+            <a:endParaRPr lang="en-US" dirty="0"/>
+          </a:p>
+        </p:txBody>
+      </p:sp>
+      <p:sp>
+        <p:nvSpPr>
+          <p:cNvPr id="5" name="Oval 4"/>
+          <p:cNvSpPr/>
+          <p:nvPr/>
+        </p:nvSpPr>
+        <p:spPr>
+          <a:xfrm>
+            <a:off x="8406345" y="5116552"/>
+            <a:ext cx="914400" cy="914400"/>
+          </a:xfrm>
+          <a:prstGeom prst="ellipse">
+            <a:avLst/>
+          </a:prstGeom>
+        </p:spPr>
+        <p:style>
+          <a:lnRef idx="1">
+            <a:schemeClr val="accent1"/>
+          </a:lnRef>
+          <a:fillRef idx="3">
+            <a:schemeClr val="accent1"/>
+          </a:fillRef>
+          <a:effectRef idx="2">
+            <a:schemeClr val="accent1"/>
+          </a:effectRef>
+          <a:fontRef idx="minor">
+            <a:schemeClr val="lt1"/>
+          </a:fontRef>
+        </p:style>
+        <p:txBody>
+          <a:bodyPr rtlCol="0" anchor="ctr"/>
+          <a:lstStyle/>
+          <a:p>
+            <a:pPr algn="ctr"/>
+            <a:r>
+              <a:rPr lang="en-US" dirty="0" smtClean="0"/>
+              <a:t>14</a:t>
+            </a:r>
+            <a:endParaRPr lang="en-US" dirty="0"/>
+          </a:p>
+        </p:txBody>
+      </p:sp>
+      <p:sp>
+        <p:nvSpPr>
+          <p:cNvPr id="5" name="Oval 4"/>
+          <p:cNvSpPr/>
+          <p:nvPr/>
+        </p:nvSpPr>
+        <p:spPr>
+          <a:xfrm>
+            <a:off x="3772253" y="2972047"/>
+            <a:ext cx="914400" cy="914400"/>
+          </a:xfrm>
+          <a:prstGeom prst="ellipse">
+            <a:avLst/>
+          </a:prstGeom>
+        </p:spPr>
+        <p:style>
+          <a:lnRef idx="1">
+            <a:schemeClr val="accent1"/>
+          </a:lnRef>
+          <a:fillRef idx="3">
+            <a:schemeClr val="accent1"/>
+          </a:fillRef>
+          <a:effectRef idx="2">
+            <a:schemeClr val="accent1"/>
+          </a:effectRef>
+          <a:fontRef idx="minor">
+            <a:schemeClr val="lt1"/>
+          </a:fontRef>
+        </p:style>
+        <p:txBody>
+          <a:bodyPr rtlCol="0" anchor="ctr"/>
+          <a:lstStyle/>
+          <a:p>
+            <a:pPr algn="ctr"/>
+            <a:r>
+              <a:rPr lang="en-US" dirty="0" smtClean="0"/>
+              <a:t>15</a:t>
+            </a:r>
+            <a:endParaRPr lang="en-US" dirty="0"/>
+          </a:p>
+        </p:txBody>
+      </p:sp>
+      <p:sp>
+        <p:nvSpPr>
+          <p:cNvPr id="5" name="Oval 4"/>
+          <p:cNvSpPr/>
+          <p:nvPr/>
+        </p:nvSpPr>
+        <p:spPr>
+          <a:xfrm>
+            <a:off x="5857786" y="70487"/>
+            <a:ext cx="914400" cy="914400"/>
+          </a:xfrm>
+          <a:prstGeom prst="ellipse">
+            <a:avLst/>
+          </a:prstGeom>
+        </p:spPr>
+        <p:style>
+          <a:lnRef idx="1">
+            <a:schemeClr val="accent1"/>
+          </a:lnRef>
+          <a:fillRef idx="3">
+            <a:schemeClr val="accent1"/>
+          </a:fillRef>
+          <a:effectRef idx="2">
+            <a:schemeClr val="accent1"/>
+          </a:effectRef>
+          <a:fontRef idx="minor">
+            <a:schemeClr val="lt1"/>
+          </a:fontRef>
+        </p:style>
+        <p:txBody>
+          <a:bodyPr rtlCol="0" anchor="ctr"/>
+          <a:lstStyle/>
+          <a:p>
+            <a:pPr algn="ctr"/>
+            <a:r>
+              <a:rPr lang="en-US" dirty="0" smtClean="0"/>
+              <a:t>16</a:t>
+            </a:r>
+            <a:endParaRPr lang="en-US" dirty="0"/>
+          </a:p>
+        </p:txBody>
+      </p:sp>
+      <p:sp>
+        <p:nvSpPr>
+          <p:cNvPr id="5" name="Oval 4"/>
+          <p:cNvSpPr/>
+          <p:nvPr/>
+        </p:nvSpPr>
+        <p:spPr>
+          <a:xfrm>
+            <a:off x="6121848" y="2195182"/>
+            <a:ext cx="914400" cy="914400"/>
+          </a:xfrm>
+          <a:prstGeom prst="ellipse">
+            <a:avLst/>
+          </a:prstGeom>
+        </p:spPr>
+        <p:style>
+          <a:lnRef idx="1">
+            <a:schemeClr val="accent1"/>
+          </a:lnRef>
+          <a:fillRef idx="3">
+            <a:schemeClr val="accent1"/>
+          </a:fillRef>
+          <a:effectRef idx="2">
+            <a:schemeClr val="accent1"/>
+          </a:effectRef>
+          <a:fontRef idx="minor">
+            <a:schemeClr val="lt1"/>
+          </a:fontRef>
+        </p:style>
+        <p:txBody>
+          <a:bodyPr rtlCol="0" anchor="ctr"/>
+          <a:lstStyle/>
+          <a:p>
+            <a:pPr algn="ctr"/>
+            <a:r>
+              <a:rPr lang="en-US" dirty="0" smtClean="0"/>
+              <a:t>17</a:t>
+            </a:r>
+            <a:endParaRPr lang="en-US" dirty="0"/>
+          </a:p>
+        </p:txBody>
+      </p:sp>
+      <p:sp>
+        <p:nvSpPr>
+          <p:cNvPr id="5" name="Oval 4"/>
+          <p:cNvSpPr/>
+          <p:nvPr/>
+        </p:nvSpPr>
+        <p:spPr>
+          <a:xfrm>
+            <a:off x="2074887" y="1219369"/>
+            <a:ext cx="914400" cy="914400"/>
+          </a:xfrm>
+          <a:prstGeom prst="ellipse">
+            <a:avLst/>
+          </a:prstGeom>
+        </p:spPr>
+        <p:style>
+          <a:lnRef idx="1">
+            <a:schemeClr val="accent1"/>
+          </a:lnRef>
+          <a:fillRef idx="3">
+            <a:schemeClr val="accent1"/>
+          </a:fillRef>
+          <a:effectRef idx="2">
+            <a:schemeClr val="accent1"/>
+          </a:effectRef>
+          <a:fontRef idx="minor">
+            <a:schemeClr val="lt1"/>
+          </a:fontRef>
+        </p:style>
+        <p:txBody>
+          <a:bodyPr rtlCol="0" anchor="ctr"/>
+          <a:lstStyle/>
+          <a:p>
+            <a:pPr algn="ctr"/>
+            <a:r>
+              <a:rPr lang="en-US" dirty="0" smtClean="0"/>
+              <a:t>18</a:t>
+            </a:r>
+            <a:endParaRPr lang="en-US" dirty="0"/>
+          </a:p>
+        </p:txBody>
+      </p:sp>
+      <p:sp>
+        <p:nvSpPr>
+          <p:cNvPr id="5" name="Oval 4"/>
+          <p:cNvSpPr/>
+          <p:nvPr/>
+        </p:nvSpPr>
+        <p:spPr>
+          <a:xfrm>
+            <a:off x="1213278" y="2388661"/>
+            <a:ext cx="914400" cy="914400"/>
+          </a:xfrm>
+          <a:prstGeom prst="ellipse">
+            <a:avLst/>
+          </a:prstGeom>
+        </p:spPr>
+        <p:style>
+          <a:lnRef idx="1">
+            <a:schemeClr val="accent1"/>
+          </a:lnRef>
+          <a:fillRef idx="3">
+            <a:schemeClr val="accent1"/>
+          </a:fillRef>
+          <a:effectRef idx="2">
+            <a:schemeClr val="accent1"/>
+          </a:effectRef>
+          <a:fontRef idx="minor">
+            <a:schemeClr val="lt1"/>
+          </a:fontRef>
+        </p:style>
+        <p:txBody>
+          <a:bodyPr rtlCol="0" anchor="ctr"/>
+          <a:lstStyle/>
+          <a:p>
+            <a:pPr algn="ctr"/>
+            <a:r>
+              <a:rPr lang="en-US" dirty="0" smtClean="0"/>
+              <a:t>19</a:t>
+            </a:r>
+            <a:endParaRPr lang="en-US" dirty="0"/>
+          </a:p>
+        </p:txBody>
+      </p:sp>
+      <p:graphicFrame>
+        <p:nvGraphicFramePr>
+          <p:cNvPr id="5" name="Chart 4"/>
+          <p:cNvGraphicFramePr/>
+          <p:nvPr>
+            <p:extLst>
+              <p:ext uri="{D42A27DB-BD31-4B8C-83A1-F6EECF244321}">
+                <p14:modId xmlns:p14="http://schemas.microsoft.com/office/powerpoint/2010/main" val="3543180680"/>
+              </p:ext>
+            </p:extLst>
+          </p:nvPr>
+        </p:nvGraphicFramePr>
+        <p:xfrm>
+          <a:off x="1524000" y="1397000"/>
+          <a:ext cx="6096000" cy="4064000"/>
+        </p:xfrm>
+        <a:graphic>
+          <a:graphicData uri="http://schemas.openxmlformats.org/drawingml/2006/chart">
+            <c:chart xmlns:c="http://schemas.openxmlformats.org/drawingml/2006/chart" xmlns:r="http://schemas.openxmlformats.org/officeDocument/2006/relationships" r:id="rId2"/>
+          </a:graphicData>
+        </a:graphic>
+      </p:graphicFrame>
     </p:spTree>
     <p:extLst>
       <p:ext uri="{BB962C8B-B14F-4D97-AF65-F5344CB8AC3E}">

</xml_diff>

<commit_message>
Generate slide from layout
</commit_message>
<xml_diff>
--- a/test/files/parts3-a.pptx
+++ b/test/files/parts3-a.pptx
@@ -966,7 +966,7 @@
 </file>
 
 <file path=ppt/slideLayouts/slideLayout2.xml><?xml version="1.0" encoding="utf-8"?>
-<p:sldLayout xmlns:a="http://schemas.openxmlformats.org/drawingml/2006/main" xmlns:r="http://schemas.openxmlformats.org/officeDocument/2006/relationships" xmlns:p="http://schemas.openxmlformats.org/presentationml/2006/main" type="obj" preserve="1">
+<p:sldLayout xmlns:a="http://schemas.openxmlformats.org/drawingml/2006/main" xmlns:r="http://schemas.openxmlformats.org/officeDocument/2006/relationships" xmlns:p="http://schemas.openxmlformats.org/presentationml/2006/main">
   <p:cSld name="Title and Content">
     <p:spTree>
       <p:nvGrpSpPr>
@@ -1136,7 +1136,7 @@
 </file>
 
 <file path=ppt/slideLayouts/slideLayout3.xml><?xml version="1.0" encoding="utf-8"?>
-<p:sldLayout xmlns:a="http://schemas.openxmlformats.org/drawingml/2006/main" xmlns:r="http://schemas.openxmlformats.org/officeDocument/2006/relationships" xmlns:p="http://schemas.openxmlformats.org/presentationml/2006/main" type="secHead" preserve="1">
+<p:sldLayout xmlns:a="http://schemas.openxmlformats.org/drawingml/2006/main" xmlns:r="http://schemas.openxmlformats.org/officeDocument/2006/relationships" xmlns:p="http://schemas.openxmlformats.org/presentationml/2006/main">
   <p:cSld name="Section Header">
     <p:spTree>
       <p:nvGrpSpPr>
@@ -3538,846 +3538,6 @@
           </a:p>
         </p:txBody>
       </p:sp>
-      <p:sp>
-        <p:nvSpPr>
-          <p:cNvPr id="5" name="Oval 4"/>
-          <p:cNvSpPr/>
-          <p:nvPr/>
-        </p:nvSpPr>
-        <p:spPr>
-          <a:xfrm>
-            <a:off x="4690240" y="3880161"/>
-            <a:ext cx="914400" cy="914400"/>
-          </a:xfrm>
-          <a:prstGeom prst="ellipse">
-            <a:avLst/>
-          </a:prstGeom>
-        </p:spPr>
-        <p:style>
-          <a:lnRef idx="1">
-            <a:schemeClr val="accent1"/>
-          </a:lnRef>
-          <a:fillRef idx="3">
-            <a:schemeClr val="accent1"/>
-          </a:fillRef>
-          <a:effectRef idx="2">
-            <a:schemeClr val="accent1"/>
-          </a:effectRef>
-          <a:fontRef idx="minor">
-            <a:schemeClr val="lt1"/>
-          </a:fontRef>
-        </p:style>
-        <p:txBody>
-          <a:bodyPr rtlCol="0" anchor="ctr"/>
-          <a:lstStyle/>
-          <a:p>
-            <a:pPr algn="ctr"/>
-            <a:r>
-              <a:rPr lang="en-US" dirty="0" smtClean="0"/>
-              <a:t>0</a:t>
-            </a:r>
-            <a:endParaRPr lang="en-US" dirty="0"/>
-          </a:p>
-        </p:txBody>
-      </p:sp>
-      <p:sp>
-        <p:nvSpPr>
-          <p:cNvPr id="5" name="Oval 4"/>
-          <p:cNvSpPr/>
-          <p:nvPr/>
-        </p:nvSpPr>
-        <p:spPr>
-          <a:xfrm>
-            <a:off x="3198099" y="651346"/>
-            <a:ext cx="914400" cy="914400"/>
-          </a:xfrm>
-          <a:prstGeom prst="ellipse">
-            <a:avLst/>
-          </a:prstGeom>
-        </p:spPr>
-        <p:style>
-          <a:lnRef idx="1">
-            <a:schemeClr val="accent1"/>
-          </a:lnRef>
-          <a:fillRef idx="3">
-            <a:schemeClr val="accent1"/>
-          </a:fillRef>
-          <a:effectRef idx="2">
-            <a:schemeClr val="accent1"/>
-          </a:effectRef>
-          <a:fontRef idx="minor">
-            <a:schemeClr val="lt1"/>
-          </a:fontRef>
-        </p:style>
-        <p:txBody>
-          <a:bodyPr rtlCol="0" anchor="ctr"/>
-          <a:lstStyle/>
-          <a:p>
-            <a:pPr algn="ctr"/>
-            <a:r>
-              <a:rPr lang="en-US" dirty="0" smtClean="0"/>
-              <a:t>1</a:t>
-            </a:r>
-            <a:endParaRPr lang="en-US" dirty="0"/>
-          </a:p>
-        </p:txBody>
-      </p:sp>
-      <p:sp>
-        <p:nvSpPr>
-          <p:cNvPr id="5" name="Oval 4"/>
-          <p:cNvSpPr/>
-          <p:nvPr/>
-        </p:nvSpPr>
-        <p:spPr>
-          <a:xfrm>
-            <a:off x="3173903" y="2410015"/>
-            <a:ext cx="914400" cy="914400"/>
-          </a:xfrm>
-          <a:prstGeom prst="ellipse">
-            <a:avLst/>
-          </a:prstGeom>
-        </p:spPr>
-        <p:style>
-          <a:lnRef idx="1">
-            <a:schemeClr val="accent1"/>
-          </a:lnRef>
-          <a:fillRef idx="3">
-            <a:schemeClr val="accent1"/>
-          </a:fillRef>
-          <a:effectRef idx="2">
-            <a:schemeClr val="accent1"/>
-          </a:effectRef>
-          <a:fontRef idx="minor">
-            <a:schemeClr val="lt1"/>
-          </a:fontRef>
-        </p:style>
-        <p:txBody>
-          <a:bodyPr rtlCol="0" anchor="ctr"/>
-          <a:lstStyle/>
-          <a:p>
-            <a:pPr algn="ctr"/>
-            <a:r>
-              <a:rPr lang="en-US" dirty="0" smtClean="0"/>
-              <a:t>2</a:t>
-            </a:r>
-            <a:endParaRPr lang="en-US" dirty="0"/>
-          </a:p>
-        </p:txBody>
-      </p:sp>
-      <p:sp>
-        <p:nvSpPr>
-          <p:cNvPr id="5" name="Oval 4"/>
-          <p:cNvSpPr/>
-          <p:nvPr/>
-        </p:nvSpPr>
-        <p:spPr>
-          <a:xfrm>
-            <a:off x="8026952" y="4711234"/>
-            <a:ext cx="914400" cy="914400"/>
-          </a:xfrm>
-          <a:prstGeom prst="ellipse">
-            <a:avLst/>
-          </a:prstGeom>
-        </p:spPr>
-        <p:style>
-          <a:lnRef idx="1">
-            <a:schemeClr val="accent1"/>
-          </a:lnRef>
-          <a:fillRef idx="3">
-            <a:schemeClr val="accent1"/>
-          </a:fillRef>
-          <a:effectRef idx="2">
-            <a:schemeClr val="accent1"/>
-          </a:effectRef>
-          <a:fontRef idx="minor">
-            <a:schemeClr val="lt1"/>
-          </a:fontRef>
-        </p:style>
-        <p:txBody>
-          <a:bodyPr rtlCol="0" anchor="ctr"/>
-          <a:lstStyle/>
-          <a:p>
-            <a:pPr algn="ctr"/>
-            <a:r>
-              <a:rPr lang="en-US" dirty="0" smtClean="0"/>
-              <a:t>3</a:t>
-            </a:r>
-            <a:endParaRPr lang="en-US" dirty="0"/>
-          </a:p>
-        </p:txBody>
-      </p:sp>
-      <p:sp>
-        <p:nvSpPr>
-          <p:cNvPr id="5" name="Oval 4"/>
-          <p:cNvSpPr/>
-          <p:nvPr/>
-        </p:nvSpPr>
-        <p:spPr>
-          <a:xfrm>
-            <a:off x="3071371" y="3895723"/>
-            <a:ext cx="914400" cy="914400"/>
-          </a:xfrm>
-          <a:prstGeom prst="ellipse">
-            <a:avLst/>
-          </a:prstGeom>
-        </p:spPr>
-        <p:style>
-          <a:lnRef idx="1">
-            <a:schemeClr val="accent1"/>
-          </a:lnRef>
-          <a:fillRef idx="3">
-            <a:schemeClr val="accent1"/>
-          </a:fillRef>
-          <a:effectRef idx="2">
-            <a:schemeClr val="accent1"/>
-          </a:effectRef>
-          <a:fontRef idx="minor">
-            <a:schemeClr val="lt1"/>
-          </a:fontRef>
-        </p:style>
-        <p:txBody>
-          <a:bodyPr rtlCol="0" anchor="ctr"/>
-          <a:lstStyle/>
-          <a:p>
-            <a:pPr algn="ctr"/>
-            <a:r>
-              <a:rPr lang="en-US" dirty="0" smtClean="0"/>
-              <a:t>4</a:t>
-            </a:r>
-            <a:endParaRPr lang="en-US" dirty="0"/>
-          </a:p>
-        </p:txBody>
-      </p:sp>
-      <p:sp>
-        <p:nvSpPr>
-          <p:cNvPr id="5" name="Oval 4"/>
-          <p:cNvSpPr/>
-          <p:nvPr/>
-        </p:nvSpPr>
-        <p:spPr>
-          <a:xfrm>
-            <a:off x="1477957" y="2744507"/>
-            <a:ext cx="914400" cy="914400"/>
-          </a:xfrm>
-          <a:prstGeom prst="ellipse">
-            <a:avLst/>
-          </a:prstGeom>
-        </p:spPr>
-        <p:style>
-          <a:lnRef idx="1">
-            <a:schemeClr val="accent1"/>
-          </a:lnRef>
-          <a:fillRef idx="3">
-            <a:schemeClr val="accent1"/>
-          </a:fillRef>
-          <a:effectRef idx="2">
-            <a:schemeClr val="accent1"/>
-          </a:effectRef>
-          <a:fontRef idx="minor">
-            <a:schemeClr val="lt1"/>
-          </a:fontRef>
-        </p:style>
-        <p:txBody>
-          <a:bodyPr rtlCol="0" anchor="ctr"/>
-          <a:lstStyle/>
-          <a:p>
-            <a:pPr algn="ctr"/>
-            <a:r>
-              <a:rPr lang="en-US" dirty="0" smtClean="0"/>
-              <a:t>5</a:t>
-            </a:r>
-            <a:endParaRPr lang="en-US" dirty="0"/>
-          </a:p>
-        </p:txBody>
-      </p:sp>
-      <p:sp>
-        <p:nvSpPr>
-          <p:cNvPr id="5" name="Oval 4"/>
-          <p:cNvSpPr/>
-          <p:nvPr/>
-        </p:nvSpPr>
-        <p:spPr>
-          <a:xfrm>
-            <a:off x="6651637" y="1262794"/>
-            <a:ext cx="914400" cy="914400"/>
-          </a:xfrm>
-          <a:prstGeom prst="ellipse">
-            <a:avLst/>
-          </a:prstGeom>
-        </p:spPr>
-        <p:style>
-          <a:lnRef idx="1">
-            <a:schemeClr val="accent1"/>
-          </a:lnRef>
-          <a:fillRef idx="3">
-            <a:schemeClr val="accent1"/>
-          </a:fillRef>
-          <a:effectRef idx="2">
-            <a:schemeClr val="accent1"/>
-          </a:effectRef>
-          <a:fontRef idx="minor">
-            <a:schemeClr val="lt1"/>
-          </a:fontRef>
-        </p:style>
-        <p:txBody>
-          <a:bodyPr rtlCol="0" anchor="ctr"/>
-          <a:lstStyle/>
-          <a:p>
-            <a:pPr algn="ctr"/>
-            <a:r>
-              <a:rPr lang="en-US" dirty="0" smtClean="0"/>
-              <a:t>6</a:t>
-            </a:r>
-            <a:endParaRPr lang="en-US" dirty="0"/>
-          </a:p>
-        </p:txBody>
-      </p:sp>
-      <p:sp>
-        <p:nvSpPr>
-          <p:cNvPr id="5" name="Oval 4"/>
-          <p:cNvSpPr/>
-          <p:nvPr/>
-        </p:nvSpPr>
-        <p:spPr>
-          <a:xfrm>
-            <a:off x="8977749" y="3874175"/>
-            <a:ext cx="914400" cy="914400"/>
-          </a:xfrm>
-          <a:prstGeom prst="ellipse">
-            <a:avLst/>
-          </a:prstGeom>
-        </p:spPr>
-        <p:style>
-          <a:lnRef idx="1">
-            <a:schemeClr val="accent1"/>
-          </a:lnRef>
-          <a:fillRef idx="3">
-            <a:schemeClr val="accent1"/>
-          </a:fillRef>
-          <a:effectRef idx="2">
-            <a:schemeClr val="accent1"/>
-          </a:effectRef>
-          <a:fontRef idx="minor">
-            <a:schemeClr val="lt1"/>
-          </a:fontRef>
-        </p:style>
-        <p:txBody>
-          <a:bodyPr rtlCol="0" anchor="ctr"/>
-          <a:lstStyle/>
-          <a:p>
-            <a:pPr algn="ctr"/>
-            <a:r>
-              <a:rPr lang="en-US" dirty="0" smtClean="0"/>
-              <a:t>7</a:t>
-            </a:r>
-            <a:endParaRPr lang="en-US" dirty="0"/>
-          </a:p>
-        </p:txBody>
-      </p:sp>
-      <p:sp>
-        <p:nvSpPr>
-          <p:cNvPr id="5" name="Oval 4"/>
-          <p:cNvSpPr/>
-          <p:nvPr/>
-        </p:nvSpPr>
-        <p:spPr>
-          <a:xfrm>
-            <a:off x="3704938" y="4425627"/>
-            <a:ext cx="914400" cy="914400"/>
-          </a:xfrm>
-          <a:prstGeom prst="ellipse">
-            <a:avLst/>
-          </a:prstGeom>
-        </p:spPr>
-        <p:style>
-          <a:lnRef idx="1">
-            <a:schemeClr val="accent1"/>
-          </a:lnRef>
-          <a:fillRef idx="3">
-            <a:schemeClr val="accent1"/>
-          </a:fillRef>
-          <a:effectRef idx="2">
-            <a:schemeClr val="accent1"/>
-          </a:effectRef>
-          <a:fontRef idx="minor">
-            <a:schemeClr val="lt1"/>
-          </a:fontRef>
-        </p:style>
-        <p:txBody>
-          <a:bodyPr rtlCol="0" anchor="ctr"/>
-          <a:lstStyle/>
-          <a:p>
-            <a:pPr algn="ctr"/>
-            <a:r>
-              <a:rPr lang="en-US" dirty="0" smtClean="0"/>
-              <a:t>8</a:t>
-            </a:r>
-            <a:endParaRPr lang="en-US" dirty="0"/>
-          </a:p>
-        </p:txBody>
-      </p:sp>
-      <p:sp>
-        <p:nvSpPr>
-          <p:cNvPr id="5" name="Oval 4"/>
-          <p:cNvSpPr/>
-          <p:nvPr/>
-        </p:nvSpPr>
-        <p:spPr>
-          <a:xfrm>
-            <a:off x="7837432" y="216830"/>
-            <a:ext cx="914400" cy="914400"/>
-          </a:xfrm>
-          <a:prstGeom prst="ellipse">
-            <a:avLst/>
-          </a:prstGeom>
-        </p:spPr>
-        <p:style>
-          <a:lnRef idx="1">
-            <a:schemeClr val="accent1"/>
-          </a:lnRef>
-          <a:fillRef idx="3">
-            <a:schemeClr val="accent1"/>
-          </a:fillRef>
-          <a:effectRef idx="2">
-            <a:schemeClr val="accent1"/>
-          </a:effectRef>
-          <a:fontRef idx="minor">
-            <a:schemeClr val="lt1"/>
-          </a:fontRef>
-        </p:style>
-        <p:txBody>
-          <a:bodyPr rtlCol="0" anchor="ctr"/>
-          <a:lstStyle/>
-          <a:p>
-            <a:pPr algn="ctr"/>
-            <a:r>
-              <a:rPr lang="en-US" dirty="0" smtClean="0"/>
-              <a:t>9</a:t>
-            </a:r>
-            <a:endParaRPr lang="en-US" dirty="0"/>
-          </a:p>
-        </p:txBody>
-      </p:sp>
-      <p:sp>
-        <p:nvSpPr>
-          <p:cNvPr id="5" name="Oval 4"/>
-          <p:cNvSpPr/>
-          <p:nvPr/>
-        </p:nvSpPr>
-        <p:spPr>
-          <a:xfrm>
-            <a:off x="3591484" y="5140679"/>
-            <a:ext cx="914400" cy="914400"/>
-          </a:xfrm>
-          <a:prstGeom prst="ellipse">
-            <a:avLst/>
-          </a:prstGeom>
-        </p:spPr>
-        <p:style>
-          <a:lnRef idx="1">
-            <a:schemeClr val="accent1"/>
-          </a:lnRef>
-          <a:fillRef idx="3">
-            <a:schemeClr val="accent1"/>
-          </a:fillRef>
-          <a:effectRef idx="2">
-            <a:schemeClr val="accent1"/>
-          </a:effectRef>
-          <a:fontRef idx="minor">
-            <a:schemeClr val="lt1"/>
-          </a:fontRef>
-        </p:style>
-        <p:txBody>
-          <a:bodyPr rtlCol="0" anchor="ctr"/>
-          <a:lstStyle/>
-          <a:p>
-            <a:pPr algn="ctr"/>
-            <a:r>
-              <a:rPr lang="en-US" dirty="0" smtClean="0"/>
-              <a:t>10</a:t>
-            </a:r>
-            <a:endParaRPr lang="en-US" dirty="0"/>
-          </a:p>
-        </p:txBody>
-      </p:sp>
-      <p:sp>
-        <p:nvSpPr>
-          <p:cNvPr id="5" name="Oval 4"/>
-          <p:cNvSpPr/>
-          <p:nvPr/>
-        </p:nvSpPr>
-        <p:spPr>
-          <a:xfrm>
-            <a:off x="5184558" y="4377945"/>
-            <a:ext cx="914400" cy="914400"/>
-          </a:xfrm>
-          <a:prstGeom prst="ellipse">
-            <a:avLst/>
-          </a:prstGeom>
-        </p:spPr>
-        <p:style>
-          <a:lnRef idx="1">
-            <a:schemeClr val="accent1"/>
-          </a:lnRef>
-          <a:fillRef idx="3">
-            <a:schemeClr val="accent1"/>
-          </a:fillRef>
-          <a:effectRef idx="2">
-            <a:schemeClr val="accent1"/>
-          </a:effectRef>
-          <a:fontRef idx="minor">
-            <a:schemeClr val="lt1"/>
-          </a:fontRef>
-        </p:style>
-        <p:txBody>
-          <a:bodyPr rtlCol="0" anchor="ctr"/>
-          <a:lstStyle/>
-          <a:p>
-            <a:pPr algn="ctr"/>
-            <a:r>
-              <a:rPr lang="en-US" dirty="0" smtClean="0"/>
-              <a:t>11</a:t>
-            </a:r>
-            <a:endParaRPr lang="en-US" dirty="0"/>
-          </a:p>
-        </p:txBody>
-      </p:sp>
-      <p:sp>
-        <p:nvSpPr>
-          <p:cNvPr id="5" name="Oval 4"/>
-          <p:cNvSpPr/>
-          <p:nvPr/>
-        </p:nvSpPr>
-        <p:spPr>
-          <a:xfrm>
-            <a:off x="2299361" y="5271145"/>
-            <a:ext cx="914400" cy="914400"/>
-          </a:xfrm>
-          <a:prstGeom prst="ellipse">
-            <a:avLst/>
-          </a:prstGeom>
-        </p:spPr>
-        <p:style>
-          <a:lnRef idx="1">
-            <a:schemeClr val="accent1"/>
-          </a:lnRef>
-          <a:fillRef idx="3">
-            <a:schemeClr val="accent1"/>
-          </a:fillRef>
-          <a:effectRef idx="2">
-            <a:schemeClr val="accent1"/>
-          </a:effectRef>
-          <a:fontRef idx="minor">
-            <a:schemeClr val="lt1"/>
-          </a:fontRef>
-        </p:style>
-        <p:txBody>
-          <a:bodyPr rtlCol="0" anchor="ctr"/>
-          <a:lstStyle/>
-          <a:p>
-            <a:pPr algn="ctr"/>
-            <a:r>
-              <a:rPr lang="en-US" dirty="0" smtClean="0"/>
-              <a:t>12</a:t>
-            </a:r>
-            <a:endParaRPr lang="en-US" dirty="0"/>
-          </a:p>
-        </p:txBody>
-      </p:sp>
-      <p:sp>
-        <p:nvSpPr>
-          <p:cNvPr id="5" name="Oval 4"/>
-          <p:cNvSpPr/>
-          <p:nvPr/>
-        </p:nvSpPr>
-        <p:spPr>
-          <a:xfrm>
-            <a:off x="8551041" y="1462140"/>
-            <a:ext cx="914400" cy="914400"/>
-          </a:xfrm>
-          <a:prstGeom prst="ellipse">
-            <a:avLst/>
-          </a:prstGeom>
-        </p:spPr>
-        <p:style>
-          <a:lnRef idx="1">
-            <a:schemeClr val="accent1"/>
-          </a:lnRef>
-          <a:fillRef idx="3">
-            <a:schemeClr val="accent1"/>
-          </a:fillRef>
-          <a:effectRef idx="2">
-            <a:schemeClr val="accent1"/>
-          </a:effectRef>
-          <a:fontRef idx="minor">
-            <a:schemeClr val="lt1"/>
-          </a:fontRef>
-        </p:style>
-        <p:txBody>
-          <a:bodyPr rtlCol="0" anchor="ctr"/>
-          <a:lstStyle/>
-          <a:p>
-            <a:pPr algn="ctr"/>
-            <a:r>
-              <a:rPr lang="en-US" dirty="0" smtClean="0"/>
-              <a:t>13</a:t>
-            </a:r>
-            <a:endParaRPr lang="en-US" dirty="0"/>
-          </a:p>
-        </p:txBody>
-      </p:sp>
-      <p:sp>
-        <p:nvSpPr>
-          <p:cNvPr id="5" name="Oval 4"/>
-          <p:cNvSpPr/>
-          <p:nvPr/>
-        </p:nvSpPr>
-        <p:spPr>
-          <a:xfrm>
-            <a:off x="8406345" y="5116552"/>
-            <a:ext cx="914400" cy="914400"/>
-          </a:xfrm>
-          <a:prstGeom prst="ellipse">
-            <a:avLst/>
-          </a:prstGeom>
-        </p:spPr>
-        <p:style>
-          <a:lnRef idx="1">
-            <a:schemeClr val="accent1"/>
-          </a:lnRef>
-          <a:fillRef idx="3">
-            <a:schemeClr val="accent1"/>
-          </a:fillRef>
-          <a:effectRef idx="2">
-            <a:schemeClr val="accent1"/>
-          </a:effectRef>
-          <a:fontRef idx="minor">
-            <a:schemeClr val="lt1"/>
-          </a:fontRef>
-        </p:style>
-        <p:txBody>
-          <a:bodyPr rtlCol="0" anchor="ctr"/>
-          <a:lstStyle/>
-          <a:p>
-            <a:pPr algn="ctr"/>
-            <a:r>
-              <a:rPr lang="en-US" dirty="0" smtClean="0"/>
-              <a:t>14</a:t>
-            </a:r>
-            <a:endParaRPr lang="en-US" dirty="0"/>
-          </a:p>
-        </p:txBody>
-      </p:sp>
-      <p:sp>
-        <p:nvSpPr>
-          <p:cNvPr id="5" name="Oval 4"/>
-          <p:cNvSpPr/>
-          <p:nvPr/>
-        </p:nvSpPr>
-        <p:spPr>
-          <a:xfrm>
-            <a:off x="3772253" y="2972047"/>
-            <a:ext cx="914400" cy="914400"/>
-          </a:xfrm>
-          <a:prstGeom prst="ellipse">
-            <a:avLst/>
-          </a:prstGeom>
-        </p:spPr>
-        <p:style>
-          <a:lnRef idx="1">
-            <a:schemeClr val="accent1"/>
-          </a:lnRef>
-          <a:fillRef idx="3">
-            <a:schemeClr val="accent1"/>
-          </a:fillRef>
-          <a:effectRef idx="2">
-            <a:schemeClr val="accent1"/>
-          </a:effectRef>
-          <a:fontRef idx="minor">
-            <a:schemeClr val="lt1"/>
-          </a:fontRef>
-        </p:style>
-        <p:txBody>
-          <a:bodyPr rtlCol="0" anchor="ctr"/>
-          <a:lstStyle/>
-          <a:p>
-            <a:pPr algn="ctr"/>
-            <a:r>
-              <a:rPr lang="en-US" dirty="0" smtClean="0"/>
-              <a:t>15</a:t>
-            </a:r>
-            <a:endParaRPr lang="en-US" dirty="0"/>
-          </a:p>
-        </p:txBody>
-      </p:sp>
-      <p:sp>
-        <p:nvSpPr>
-          <p:cNvPr id="5" name="Oval 4"/>
-          <p:cNvSpPr/>
-          <p:nvPr/>
-        </p:nvSpPr>
-        <p:spPr>
-          <a:xfrm>
-            <a:off x="5857786" y="70487"/>
-            <a:ext cx="914400" cy="914400"/>
-          </a:xfrm>
-          <a:prstGeom prst="ellipse">
-            <a:avLst/>
-          </a:prstGeom>
-        </p:spPr>
-        <p:style>
-          <a:lnRef idx="1">
-            <a:schemeClr val="accent1"/>
-          </a:lnRef>
-          <a:fillRef idx="3">
-            <a:schemeClr val="accent1"/>
-          </a:fillRef>
-          <a:effectRef idx="2">
-            <a:schemeClr val="accent1"/>
-          </a:effectRef>
-          <a:fontRef idx="minor">
-            <a:schemeClr val="lt1"/>
-          </a:fontRef>
-        </p:style>
-        <p:txBody>
-          <a:bodyPr rtlCol="0" anchor="ctr"/>
-          <a:lstStyle/>
-          <a:p>
-            <a:pPr algn="ctr"/>
-            <a:r>
-              <a:rPr lang="en-US" dirty="0" smtClean="0"/>
-              <a:t>16</a:t>
-            </a:r>
-            <a:endParaRPr lang="en-US" dirty="0"/>
-          </a:p>
-        </p:txBody>
-      </p:sp>
-      <p:sp>
-        <p:nvSpPr>
-          <p:cNvPr id="5" name="Oval 4"/>
-          <p:cNvSpPr/>
-          <p:nvPr/>
-        </p:nvSpPr>
-        <p:spPr>
-          <a:xfrm>
-            <a:off x="6121848" y="2195182"/>
-            <a:ext cx="914400" cy="914400"/>
-          </a:xfrm>
-          <a:prstGeom prst="ellipse">
-            <a:avLst/>
-          </a:prstGeom>
-        </p:spPr>
-        <p:style>
-          <a:lnRef idx="1">
-            <a:schemeClr val="accent1"/>
-          </a:lnRef>
-          <a:fillRef idx="3">
-            <a:schemeClr val="accent1"/>
-          </a:fillRef>
-          <a:effectRef idx="2">
-            <a:schemeClr val="accent1"/>
-          </a:effectRef>
-          <a:fontRef idx="minor">
-            <a:schemeClr val="lt1"/>
-          </a:fontRef>
-        </p:style>
-        <p:txBody>
-          <a:bodyPr rtlCol="0" anchor="ctr"/>
-          <a:lstStyle/>
-          <a:p>
-            <a:pPr algn="ctr"/>
-            <a:r>
-              <a:rPr lang="en-US" dirty="0" smtClean="0"/>
-              <a:t>17</a:t>
-            </a:r>
-            <a:endParaRPr lang="en-US" dirty="0"/>
-          </a:p>
-        </p:txBody>
-      </p:sp>
-      <p:sp>
-        <p:nvSpPr>
-          <p:cNvPr id="5" name="Oval 4"/>
-          <p:cNvSpPr/>
-          <p:nvPr/>
-        </p:nvSpPr>
-        <p:spPr>
-          <a:xfrm>
-            <a:off x="2074887" y="1219369"/>
-            <a:ext cx="914400" cy="914400"/>
-          </a:xfrm>
-          <a:prstGeom prst="ellipse">
-            <a:avLst/>
-          </a:prstGeom>
-        </p:spPr>
-        <p:style>
-          <a:lnRef idx="1">
-            <a:schemeClr val="accent1"/>
-          </a:lnRef>
-          <a:fillRef idx="3">
-            <a:schemeClr val="accent1"/>
-          </a:fillRef>
-          <a:effectRef idx="2">
-            <a:schemeClr val="accent1"/>
-          </a:effectRef>
-          <a:fontRef idx="minor">
-            <a:schemeClr val="lt1"/>
-          </a:fontRef>
-        </p:style>
-        <p:txBody>
-          <a:bodyPr rtlCol="0" anchor="ctr"/>
-          <a:lstStyle/>
-          <a:p>
-            <a:pPr algn="ctr"/>
-            <a:r>
-              <a:rPr lang="en-US" dirty="0" smtClean="0"/>
-              <a:t>18</a:t>
-            </a:r>
-            <a:endParaRPr lang="en-US" dirty="0"/>
-          </a:p>
-        </p:txBody>
-      </p:sp>
-      <p:sp>
-        <p:nvSpPr>
-          <p:cNvPr id="5" name="Oval 4"/>
-          <p:cNvSpPr/>
-          <p:nvPr/>
-        </p:nvSpPr>
-        <p:spPr>
-          <a:xfrm>
-            <a:off x="1213278" y="2388661"/>
-            <a:ext cx="914400" cy="914400"/>
-          </a:xfrm>
-          <a:prstGeom prst="ellipse">
-            <a:avLst/>
-          </a:prstGeom>
-        </p:spPr>
-        <p:style>
-          <a:lnRef idx="1">
-            <a:schemeClr val="accent1"/>
-          </a:lnRef>
-          <a:fillRef idx="3">
-            <a:schemeClr val="accent1"/>
-          </a:fillRef>
-          <a:effectRef idx="2">
-            <a:schemeClr val="accent1"/>
-          </a:effectRef>
-          <a:fontRef idx="minor">
-            <a:schemeClr val="lt1"/>
-          </a:fontRef>
-        </p:style>
-        <p:txBody>
-          <a:bodyPr rtlCol="0" anchor="ctr"/>
-          <a:lstStyle/>
-          <a:p>
-            <a:pPr algn="ctr"/>
-            <a:r>
-              <a:rPr lang="en-US" dirty="0" smtClean="0"/>
-              <a:t>19</a:t>
-            </a:r>
-            <a:endParaRPr lang="en-US" dirty="0"/>
-          </a:p>
-        </p:txBody>
-      </p:sp>
       <p:graphicFrame>
         <p:nvGraphicFramePr>
           <p:cNvPr id="5" name="Chart 4"/>
@@ -4580,7 +3740,7 @@
 
 <file path=ppt/slides/slide3.xml><?xml version="1.0" encoding="utf-8"?>
 <p:sld xmlns:a="http://schemas.openxmlformats.org/drawingml/2006/main" xmlns:r="http://schemas.openxmlformats.org/officeDocument/2006/relationships" xmlns:p="http://schemas.openxmlformats.org/presentationml/2006/main">
-  <p:cSld>
+  <p:cSld name="Section Header">
     <p:spTree>
       <p:nvGrpSpPr>
         <p:cNvPr id="1" name=""/>
@@ -4602,89 +3762,212 @@
             <a:spLocks noGrp="1"/>
           </p:cNvSpPr>
           <p:nvPr>
-            <p:ph type="ctrTitle"/>
-          </p:nvPr>
-        </p:nvSpPr>
-        <p:spPr/>
-        <p:txBody>
-          <a:bodyPr/>
-          <a:lstStyle/>
-          <a:p>
-            <a:r>
-              <a:rPr lang="en-US" dirty="0" smtClean="0"/>
-              <a:t>This is the title</a:t>
-            </a:r>
-            <a:endParaRPr lang="en-US" dirty="0"/>
-          </a:p>
-        </p:txBody>
-      </p:sp>
-      <p:sp>
-        <p:nvSpPr>
-          <p:cNvPr id="3" name="Subtitle 2"/>
-          <p:cNvSpPr>
-            <a:spLocks noGrp="1"/>
-          </p:cNvSpPr>
-          <p:nvPr>
-            <p:ph type="subTitle" idx="1"/>
-          </p:nvPr>
-        </p:nvSpPr>
-        <p:spPr/>
-        <p:txBody>
-          <a:bodyPr/>
-          <a:lstStyle/>
-          <a:p>
-            <a:r>
-              <a:rPr lang="en-US" dirty="0" smtClean="0"/>
-              <a:t>This is a subtitle</a:t>
-            </a:r>
-            <a:endParaRPr lang="en-US" dirty="0"/>
-          </a:p>
-        </p:txBody>
-      </p:sp>
-      <p:sp>
-        <p:nvSpPr>
-          <p:cNvPr id="4" name="TextBox 3"/>
-          <p:cNvSpPr txBox="1"/>
-          <p:nvPr/>
+            <p:ph type="title"/>
+          </p:nvPr>
         </p:nvSpPr>
         <p:spPr>
           <a:xfrm>
-            <a:off x="2260600" y="952500"/>
-            <a:ext cx="2540000" cy="738664"/>
+            <a:off x="722313" y="4406900"/>
+            <a:ext cx="7772400" cy="1362075"/>
           </a:xfrm>
-          <a:prstGeom prst="rect">
-            <a:avLst/>
-          </a:prstGeom>
-          <a:noFill/>
-          <a:ln>
-            <a:solidFill>
-              <a:schemeClr val="tx1"/>
-            </a:solidFill>
-          </a:ln>
         </p:spPr>
         <p:txBody>
-          <a:bodyPr wrap="square" rtlCol="0">
-            <a:spAutoFit/>
-          </a:bodyPr>
-          <a:lstStyle/>
-          <a:p>
-            <a:r>
-              <a:rPr lang="en-US" sz="1400" b="1" dirty="0" smtClean="0">
+          <a:bodyPr anchor="t"/>
+          <a:lstStyle>
+            <a:lvl1pPr algn="l">
+              <a:defRPr sz="4000" b="1" cap="all"/>
+            </a:lvl1pPr>
+          </a:lstStyle>
+          <a:p>
+            <a:r>
+              <a:rPr lang="en-US" smtClean="0"/>
+              <a:t>Click to edit Master title style</a:t>
+            </a:r>
+            <a:endParaRPr lang="en-US"/>
+          </a:p>
+        </p:txBody>
+      </p:sp>
+      <p:sp>
+        <p:nvSpPr>
+          <p:cNvPr id="3" name="Text Placeholder 2"/>
+          <p:cNvSpPr>
+            <a:spLocks noGrp="1"/>
+          </p:cNvSpPr>
+          <p:nvPr>
+            <p:ph type="body" idx="1"/>
+          </p:nvPr>
+        </p:nvSpPr>
+        <p:spPr>
+          <a:xfrm>
+            <a:off x="722313" y="2906713"/>
+            <a:ext cx="7772400" cy="1500187"/>
+          </a:xfrm>
+        </p:spPr>
+        <p:txBody>
+          <a:bodyPr anchor="b"/>
+          <a:lstStyle>
+            <a:lvl1pPr marL="0" indent="0">
+              <a:buNone/>
+              <a:defRPr sz="2000">
                 <a:solidFill>
-                  <a:srgbClr val="FF0000"/>
+                  <a:schemeClr val="tx1">
+                    <a:tint val="75000"/>
+                  </a:schemeClr>
                 </a:solidFill>
-                <a:latin typeface="Arial"/>
-                <a:cs typeface="Arial"/>
-              </a:rPr>
-              <a:t>Some random red bold Arial 14pt text with defined width and a border</a:t>
-            </a:r>
-            <a:endParaRPr lang="en-US" sz="1400" b="1" dirty="0">
-              <a:solidFill>
-                <a:srgbClr val="FF0000"/>
-              </a:solidFill>
-              <a:latin typeface="Arial"/>
-              <a:cs typeface="Arial"/>
-            </a:endParaRPr>
+              </a:defRPr>
+            </a:lvl1pPr>
+            <a:lvl2pPr marL="457200" indent="0">
+              <a:buNone/>
+              <a:defRPr sz="1800">
+                <a:solidFill>
+                  <a:schemeClr val="tx1">
+                    <a:tint val="75000"/>
+                  </a:schemeClr>
+                </a:solidFill>
+              </a:defRPr>
+            </a:lvl2pPr>
+            <a:lvl3pPr marL="914400" indent="0">
+              <a:buNone/>
+              <a:defRPr sz="1600">
+                <a:solidFill>
+                  <a:schemeClr val="tx1">
+                    <a:tint val="75000"/>
+                  </a:schemeClr>
+                </a:solidFill>
+              </a:defRPr>
+            </a:lvl3pPr>
+            <a:lvl4pPr marL="1371600" indent="0">
+              <a:buNone/>
+              <a:defRPr sz="1400">
+                <a:solidFill>
+                  <a:schemeClr val="tx1">
+                    <a:tint val="75000"/>
+                  </a:schemeClr>
+                </a:solidFill>
+              </a:defRPr>
+            </a:lvl4pPr>
+            <a:lvl5pPr marL="1828800" indent="0">
+              <a:buNone/>
+              <a:defRPr sz="1400">
+                <a:solidFill>
+                  <a:schemeClr val="tx1">
+                    <a:tint val="75000"/>
+                  </a:schemeClr>
+                </a:solidFill>
+              </a:defRPr>
+            </a:lvl5pPr>
+            <a:lvl6pPr marL="2286000" indent="0">
+              <a:buNone/>
+              <a:defRPr sz="1400">
+                <a:solidFill>
+                  <a:schemeClr val="tx1">
+                    <a:tint val="75000"/>
+                  </a:schemeClr>
+                </a:solidFill>
+              </a:defRPr>
+            </a:lvl6pPr>
+            <a:lvl7pPr marL="2743200" indent="0">
+              <a:buNone/>
+              <a:defRPr sz="1400">
+                <a:solidFill>
+                  <a:schemeClr val="tx1">
+                    <a:tint val="75000"/>
+                  </a:schemeClr>
+                </a:solidFill>
+              </a:defRPr>
+            </a:lvl7pPr>
+            <a:lvl8pPr marL="3200400" indent="0">
+              <a:buNone/>
+              <a:defRPr sz="1400">
+                <a:solidFill>
+                  <a:schemeClr val="tx1">
+                    <a:tint val="75000"/>
+                  </a:schemeClr>
+                </a:solidFill>
+              </a:defRPr>
+            </a:lvl8pPr>
+            <a:lvl9pPr marL="3657600" indent="0">
+              <a:buNone/>
+              <a:defRPr sz="1400">
+                <a:solidFill>
+                  <a:schemeClr val="tx1">
+                    <a:tint val="75000"/>
+                  </a:schemeClr>
+                </a:solidFill>
+              </a:defRPr>
+            </a:lvl9pPr>
+          </a:lstStyle>
+          <a:p>
+            <a:pPr lvl="0"/>
+            <a:r>
+              <a:rPr lang="en-US" smtClean="0"/>
+              <a:t>Click to edit Master text styles</a:t>
+            </a:r>
+          </a:p>
+        </p:txBody>
+      </p:sp>
+      <p:sp>
+        <p:nvSpPr>
+          <p:cNvPr id="4" name="Date Placeholder 3"/>
+          <p:cNvSpPr>
+            <a:spLocks noGrp="1"/>
+          </p:cNvSpPr>
+          <p:nvPr>
+            <p:ph type="dt" sz="half" idx="10"/>
+          </p:nvPr>
+        </p:nvSpPr>
+        <p:spPr/>
+        <p:txBody>
+          <a:bodyPr/>
+          <a:lstStyle/>
+          <a:p>
+            <a:fld id="{0F3294C6-1118-6C43-A700-8A6D5113A96D}" type="datetimeFigureOut">
+              <a:rPr lang="en-US" smtClean="0"/>
+              <a:t>7/21/15</a:t>
+            </a:fld>
+            <a:endParaRPr lang="en-US"/>
+          </a:p>
+        </p:txBody>
+      </p:sp>
+      <p:sp>
+        <p:nvSpPr>
+          <p:cNvPr id="5" name="Footer Placeholder 4"/>
+          <p:cNvSpPr>
+            <a:spLocks noGrp="1"/>
+          </p:cNvSpPr>
+          <p:nvPr>
+            <p:ph type="ftr" sz="quarter" idx="11"/>
+          </p:nvPr>
+        </p:nvSpPr>
+        <p:spPr/>
+        <p:txBody>
+          <a:bodyPr/>
+          <a:lstStyle/>
+          <a:p>
+            <a:endParaRPr lang="en-US"/>
+          </a:p>
+        </p:txBody>
+      </p:sp>
+      <p:sp>
+        <p:nvSpPr>
+          <p:cNvPr id="6" name="Slide Number Placeholder 5"/>
+          <p:cNvSpPr>
+            <a:spLocks noGrp="1"/>
+          </p:cNvSpPr>
+          <p:nvPr>
+            <p:ph type="sldNum" sz="quarter" idx="12"/>
+          </p:nvPr>
+        </p:nvSpPr>
+        <p:spPr/>
+        <p:txBody>
+          <a:bodyPr/>
+          <a:lstStyle/>
+          <a:p>
+            <a:fld id="{5E26C44E-ECEF-2947-849D-24D613C9A5C0}" type="slidenum">
+              <a:rPr lang="en-US" smtClean="0"/>
+              <a:t>‹#›</a:t>
+            </a:fld>
+            <a:endParaRPr lang="en-US"/>
           </a:p>
         </p:txBody>
       </p:sp>
@@ -4696,8 +3979,8 @@
         </p:nvSpPr>
         <p:spPr>
           <a:xfrm>
-            <a:off x="6578600" y="787400"/>
-            <a:ext cx="1181100" cy="1181100"/>
+            <a:off x="6540895" y="5404566"/>
+            <a:ext cx="914400" cy="914400"/>
           </a:xfrm>
           <a:prstGeom prst="ellipse">
             <a:avLst/>
@@ -4724,7 +4007,805 @@
             <a:pPr algn="ctr"/>
             <a:r>
               <a:rPr lang="en-US" dirty="0" smtClean="0"/>
-              <a:t>A default circle</a:t>
+              <a:t>0</a:t>
+            </a:r>
+            <a:endParaRPr lang="en-US" dirty="0"/>
+          </a:p>
+        </p:txBody>
+      </p:sp>
+      <p:sp>
+        <p:nvSpPr>
+          <p:cNvPr id="5" name="Oval 4"/>
+          <p:cNvSpPr/>
+          <p:nvPr/>
+        </p:nvSpPr>
+        <p:spPr>
+          <a:xfrm>
+            <a:off x="4660866" y="585011"/>
+            <a:ext cx="914400" cy="914400"/>
+          </a:xfrm>
+          <a:prstGeom prst="ellipse">
+            <a:avLst/>
+          </a:prstGeom>
+        </p:spPr>
+        <p:style>
+          <a:lnRef idx="1">
+            <a:schemeClr val="accent1"/>
+          </a:lnRef>
+          <a:fillRef idx="3">
+            <a:schemeClr val="accent1"/>
+          </a:fillRef>
+          <a:effectRef idx="2">
+            <a:schemeClr val="accent1"/>
+          </a:effectRef>
+          <a:fontRef idx="minor">
+            <a:schemeClr val="lt1"/>
+          </a:fontRef>
+        </p:style>
+        <p:txBody>
+          <a:bodyPr rtlCol="0" anchor="ctr"/>
+          <a:lstStyle/>
+          <a:p>
+            <a:pPr algn="ctr"/>
+            <a:r>
+              <a:rPr lang="en-US" dirty="0" smtClean="0"/>
+              <a:t>1</a:t>
+            </a:r>
+            <a:endParaRPr lang="en-US" dirty="0"/>
+          </a:p>
+        </p:txBody>
+      </p:sp>
+      <p:sp>
+        <p:nvSpPr>
+          <p:cNvPr id="5" name="Oval 4"/>
+          <p:cNvSpPr/>
+          <p:nvPr/>
+        </p:nvSpPr>
+        <p:spPr>
+          <a:xfrm>
+            <a:off x="5149932" y="2294041"/>
+            <a:ext cx="914400" cy="914400"/>
+          </a:xfrm>
+          <a:prstGeom prst="ellipse">
+            <a:avLst/>
+          </a:prstGeom>
+        </p:spPr>
+        <p:style>
+          <a:lnRef idx="1">
+            <a:schemeClr val="accent1"/>
+          </a:lnRef>
+          <a:fillRef idx="3">
+            <a:schemeClr val="accent1"/>
+          </a:fillRef>
+          <a:effectRef idx="2">
+            <a:schemeClr val="accent1"/>
+          </a:effectRef>
+          <a:fontRef idx="minor">
+            <a:schemeClr val="lt1"/>
+          </a:fontRef>
+        </p:style>
+        <p:txBody>
+          <a:bodyPr rtlCol="0" anchor="ctr"/>
+          <a:lstStyle/>
+          <a:p>
+            <a:pPr algn="ctr"/>
+            <a:r>
+              <a:rPr lang="en-US" dirty="0" smtClean="0"/>
+              <a:t>2</a:t>
+            </a:r>
+            <a:endParaRPr lang="en-US" dirty="0"/>
+          </a:p>
+        </p:txBody>
+      </p:sp>
+      <p:sp>
+        <p:nvSpPr>
+          <p:cNvPr id="5" name="Oval 4"/>
+          <p:cNvSpPr/>
+          <p:nvPr/>
+        </p:nvSpPr>
+        <p:spPr>
+          <a:xfrm>
+            <a:off x="4464530" y="3529929"/>
+            <a:ext cx="914400" cy="914400"/>
+          </a:xfrm>
+          <a:prstGeom prst="ellipse">
+            <a:avLst/>
+          </a:prstGeom>
+        </p:spPr>
+        <p:style>
+          <a:lnRef idx="1">
+            <a:schemeClr val="accent1"/>
+          </a:lnRef>
+          <a:fillRef idx="3">
+            <a:schemeClr val="accent1"/>
+          </a:fillRef>
+          <a:effectRef idx="2">
+            <a:schemeClr val="accent1"/>
+          </a:effectRef>
+          <a:fontRef idx="minor">
+            <a:schemeClr val="lt1"/>
+          </a:fontRef>
+        </p:style>
+        <p:txBody>
+          <a:bodyPr rtlCol="0" anchor="ctr"/>
+          <a:lstStyle/>
+          <a:p>
+            <a:pPr algn="ctr"/>
+            <a:r>
+              <a:rPr lang="en-US" dirty="0" smtClean="0"/>
+              <a:t>3</a:t>
+            </a:r>
+            <a:endParaRPr lang="en-US" dirty="0"/>
+          </a:p>
+        </p:txBody>
+      </p:sp>
+      <p:sp>
+        <p:nvSpPr>
+          <p:cNvPr id="5" name="Oval 4"/>
+          <p:cNvSpPr/>
+          <p:nvPr/>
+        </p:nvSpPr>
+        <p:spPr>
+          <a:xfrm>
+            <a:off x="6801935" y="4620667"/>
+            <a:ext cx="914400" cy="914400"/>
+          </a:xfrm>
+          <a:prstGeom prst="ellipse">
+            <a:avLst/>
+          </a:prstGeom>
+        </p:spPr>
+        <p:style>
+          <a:lnRef idx="1">
+            <a:schemeClr val="accent1"/>
+          </a:lnRef>
+          <a:fillRef idx="3">
+            <a:schemeClr val="accent1"/>
+          </a:fillRef>
+          <a:effectRef idx="2">
+            <a:schemeClr val="accent1"/>
+          </a:effectRef>
+          <a:fontRef idx="minor">
+            <a:schemeClr val="lt1"/>
+          </a:fontRef>
+        </p:style>
+        <p:txBody>
+          <a:bodyPr rtlCol="0" anchor="ctr"/>
+          <a:lstStyle/>
+          <a:p>
+            <a:pPr algn="ctr"/>
+            <a:r>
+              <a:rPr lang="en-US" dirty="0" smtClean="0"/>
+              <a:t>4</a:t>
+            </a:r>
+            <a:endParaRPr lang="en-US" dirty="0"/>
+          </a:p>
+        </p:txBody>
+      </p:sp>
+      <p:sp>
+        <p:nvSpPr>
+          <p:cNvPr id="5" name="Oval 4"/>
+          <p:cNvSpPr/>
+          <p:nvPr/>
+        </p:nvSpPr>
+        <p:spPr>
+          <a:xfrm>
+            <a:off x="5588121" y="713905"/>
+            <a:ext cx="914400" cy="914400"/>
+          </a:xfrm>
+          <a:prstGeom prst="ellipse">
+            <a:avLst/>
+          </a:prstGeom>
+        </p:spPr>
+        <p:style>
+          <a:lnRef idx="1">
+            <a:schemeClr val="accent1"/>
+          </a:lnRef>
+          <a:fillRef idx="3">
+            <a:schemeClr val="accent1"/>
+          </a:fillRef>
+          <a:effectRef idx="2">
+            <a:schemeClr val="accent1"/>
+          </a:effectRef>
+          <a:fontRef idx="minor">
+            <a:schemeClr val="lt1"/>
+          </a:fontRef>
+        </p:style>
+        <p:txBody>
+          <a:bodyPr rtlCol="0" anchor="ctr"/>
+          <a:lstStyle/>
+          <a:p>
+            <a:pPr algn="ctr"/>
+            <a:r>
+              <a:rPr lang="en-US" dirty="0" smtClean="0"/>
+              <a:t>5</a:t>
+            </a:r>
+            <a:endParaRPr lang="en-US" dirty="0"/>
+          </a:p>
+        </p:txBody>
+      </p:sp>
+      <p:sp>
+        <p:nvSpPr>
+          <p:cNvPr id="5" name="Oval 4"/>
+          <p:cNvSpPr/>
+          <p:nvPr/>
+        </p:nvSpPr>
+        <p:spPr>
+          <a:xfrm>
+            <a:off x="6413478" y="2487960"/>
+            <a:ext cx="914400" cy="914400"/>
+          </a:xfrm>
+          <a:prstGeom prst="ellipse">
+            <a:avLst/>
+          </a:prstGeom>
+        </p:spPr>
+        <p:style>
+          <a:lnRef idx="1">
+            <a:schemeClr val="accent1"/>
+          </a:lnRef>
+          <a:fillRef idx="3">
+            <a:schemeClr val="accent1"/>
+          </a:fillRef>
+          <a:effectRef idx="2">
+            <a:schemeClr val="accent1"/>
+          </a:effectRef>
+          <a:fontRef idx="minor">
+            <a:schemeClr val="lt1"/>
+          </a:fontRef>
+        </p:style>
+        <p:txBody>
+          <a:bodyPr rtlCol="0" anchor="ctr"/>
+          <a:lstStyle/>
+          <a:p>
+            <a:pPr algn="ctr"/>
+            <a:r>
+              <a:rPr lang="en-US" dirty="0" smtClean="0"/>
+              <a:t>6</a:t>
+            </a:r>
+            <a:endParaRPr lang="en-US" dirty="0"/>
+          </a:p>
+        </p:txBody>
+      </p:sp>
+      <p:sp>
+        <p:nvSpPr>
+          <p:cNvPr id="5" name="Oval 4"/>
+          <p:cNvSpPr/>
+          <p:nvPr/>
+        </p:nvSpPr>
+        <p:spPr>
+          <a:xfrm>
+            <a:off x="5135605" y="4367096"/>
+            <a:ext cx="914400" cy="914400"/>
+          </a:xfrm>
+          <a:prstGeom prst="ellipse">
+            <a:avLst/>
+          </a:prstGeom>
+        </p:spPr>
+        <p:style>
+          <a:lnRef idx="1">
+            <a:schemeClr val="accent1"/>
+          </a:lnRef>
+          <a:fillRef idx="3">
+            <a:schemeClr val="accent1"/>
+          </a:fillRef>
+          <a:effectRef idx="2">
+            <a:schemeClr val="accent1"/>
+          </a:effectRef>
+          <a:fontRef idx="minor">
+            <a:schemeClr val="lt1"/>
+          </a:fontRef>
+        </p:style>
+        <p:txBody>
+          <a:bodyPr rtlCol="0" anchor="ctr"/>
+          <a:lstStyle/>
+          <a:p>
+            <a:pPr algn="ctr"/>
+            <a:r>
+              <a:rPr lang="en-US" dirty="0" smtClean="0"/>
+              <a:t>7</a:t>
+            </a:r>
+            <a:endParaRPr lang="en-US" dirty="0"/>
+          </a:p>
+        </p:txBody>
+      </p:sp>
+      <p:sp>
+        <p:nvSpPr>
+          <p:cNvPr id="5" name="Oval 4"/>
+          <p:cNvSpPr/>
+          <p:nvPr/>
+        </p:nvSpPr>
+        <p:spPr>
+          <a:xfrm>
+            <a:off x="26107" y="1986127"/>
+            <a:ext cx="914400" cy="914400"/>
+          </a:xfrm>
+          <a:prstGeom prst="ellipse">
+            <a:avLst/>
+          </a:prstGeom>
+        </p:spPr>
+        <p:style>
+          <a:lnRef idx="1">
+            <a:schemeClr val="accent1"/>
+          </a:lnRef>
+          <a:fillRef idx="3">
+            <a:schemeClr val="accent1"/>
+          </a:fillRef>
+          <a:effectRef idx="2">
+            <a:schemeClr val="accent1"/>
+          </a:effectRef>
+          <a:fontRef idx="minor">
+            <a:schemeClr val="lt1"/>
+          </a:fontRef>
+        </p:style>
+        <p:txBody>
+          <a:bodyPr rtlCol="0" anchor="ctr"/>
+          <a:lstStyle/>
+          <a:p>
+            <a:pPr algn="ctr"/>
+            <a:r>
+              <a:rPr lang="en-US" dirty="0" smtClean="0"/>
+              <a:t>8</a:t>
+            </a:r>
+            <a:endParaRPr lang="en-US" dirty="0"/>
+          </a:p>
+        </p:txBody>
+      </p:sp>
+      <p:sp>
+        <p:nvSpPr>
+          <p:cNvPr id="5" name="Oval 4"/>
+          <p:cNvSpPr/>
+          <p:nvPr/>
+        </p:nvSpPr>
+        <p:spPr>
+          <a:xfrm>
+            <a:off x="7478627" y="326057"/>
+            <a:ext cx="914400" cy="914400"/>
+          </a:xfrm>
+          <a:prstGeom prst="ellipse">
+            <a:avLst/>
+          </a:prstGeom>
+        </p:spPr>
+        <p:style>
+          <a:lnRef idx="1">
+            <a:schemeClr val="accent1"/>
+          </a:lnRef>
+          <a:fillRef idx="3">
+            <a:schemeClr val="accent1"/>
+          </a:fillRef>
+          <a:effectRef idx="2">
+            <a:schemeClr val="accent1"/>
+          </a:effectRef>
+          <a:fontRef idx="minor">
+            <a:schemeClr val="lt1"/>
+          </a:fontRef>
+        </p:style>
+        <p:txBody>
+          <a:bodyPr rtlCol="0" anchor="ctr"/>
+          <a:lstStyle/>
+          <a:p>
+            <a:pPr algn="ctr"/>
+            <a:r>
+              <a:rPr lang="en-US" dirty="0" smtClean="0"/>
+              <a:t>9</a:t>
+            </a:r>
+            <a:endParaRPr lang="en-US" dirty="0"/>
+          </a:p>
+        </p:txBody>
+      </p:sp>
+      <p:sp>
+        <p:nvSpPr>
+          <p:cNvPr id="5" name="Oval 4"/>
+          <p:cNvSpPr/>
+          <p:nvPr/>
+        </p:nvSpPr>
+        <p:spPr>
+          <a:xfrm>
+            <a:off x="8852638" y="3036884"/>
+            <a:ext cx="914400" cy="914400"/>
+          </a:xfrm>
+          <a:prstGeom prst="ellipse">
+            <a:avLst/>
+          </a:prstGeom>
+        </p:spPr>
+        <p:style>
+          <a:lnRef idx="1">
+            <a:schemeClr val="accent1"/>
+          </a:lnRef>
+          <a:fillRef idx="3">
+            <a:schemeClr val="accent1"/>
+          </a:fillRef>
+          <a:effectRef idx="2">
+            <a:schemeClr val="accent1"/>
+          </a:effectRef>
+          <a:fontRef idx="minor">
+            <a:schemeClr val="lt1"/>
+          </a:fontRef>
+        </p:style>
+        <p:txBody>
+          <a:bodyPr rtlCol="0" anchor="ctr"/>
+          <a:lstStyle/>
+          <a:p>
+            <a:pPr algn="ctr"/>
+            <a:r>
+              <a:rPr lang="en-US" dirty="0" smtClean="0"/>
+              <a:t>10</a:t>
+            </a:r>
+            <a:endParaRPr lang="en-US" dirty="0"/>
+          </a:p>
+        </p:txBody>
+      </p:sp>
+      <p:sp>
+        <p:nvSpPr>
+          <p:cNvPr id="5" name="Oval 4"/>
+          <p:cNvSpPr/>
+          <p:nvPr/>
+        </p:nvSpPr>
+        <p:spPr>
+          <a:xfrm>
+            <a:off x="8083324" y="2937457"/>
+            <a:ext cx="914400" cy="914400"/>
+          </a:xfrm>
+          <a:prstGeom prst="ellipse">
+            <a:avLst/>
+          </a:prstGeom>
+        </p:spPr>
+        <p:style>
+          <a:lnRef idx="1">
+            <a:schemeClr val="accent1"/>
+          </a:lnRef>
+          <a:fillRef idx="3">
+            <a:schemeClr val="accent1"/>
+          </a:fillRef>
+          <a:effectRef idx="2">
+            <a:schemeClr val="accent1"/>
+          </a:effectRef>
+          <a:fontRef idx="minor">
+            <a:schemeClr val="lt1"/>
+          </a:fontRef>
+        </p:style>
+        <p:txBody>
+          <a:bodyPr rtlCol="0" anchor="ctr"/>
+          <a:lstStyle/>
+          <a:p>
+            <a:pPr algn="ctr"/>
+            <a:r>
+              <a:rPr lang="en-US" dirty="0" smtClean="0"/>
+              <a:t>11</a:t>
+            </a:r>
+            <a:endParaRPr lang="en-US" dirty="0"/>
+          </a:p>
+        </p:txBody>
+      </p:sp>
+      <p:sp>
+        <p:nvSpPr>
+          <p:cNvPr id="5" name="Oval 4"/>
+          <p:cNvSpPr/>
+          <p:nvPr/>
+        </p:nvSpPr>
+        <p:spPr>
+          <a:xfrm>
+            <a:off x="5649319" y="2459254"/>
+            <a:ext cx="914400" cy="914400"/>
+          </a:xfrm>
+          <a:prstGeom prst="ellipse">
+            <a:avLst/>
+          </a:prstGeom>
+        </p:spPr>
+        <p:style>
+          <a:lnRef idx="1">
+            <a:schemeClr val="accent1"/>
+          </a:lnRef>
+          <a:fillRef idx="3">
+            <a:schemeClr val="accent1"/>
+          </a:fillRef>
+          <a:effectRef idx="2">
+            <a:schemeClr val="accent1"/>
+          </a:effectRef>
+          <a:fontRef idx="minor">
+            <a:schemeClr val="lt1"/>
+          </a:fontRef>
+        </p:style>
+        <p:txBody>
+          <a:bodyPr rtlCol="0" anchor="ctr"/>
+          <a:lstStyle/>
+          <a:p>
+            <a:pPr algn="ctr"/>
+            <a:r>
+              <a:rPr lang="en-US" dirty="0" smtClean="0"/>
+              <a:t>12</a:t>
+            </a:r>
+            <a:endParaRPr lang="en-US" dirty="0"/>
+          </a:p>
+        </p:txBody>
+      </p:sp>
+      <p:sp>
+        <p:nvSpPr>
+          <p:cNvPr id="5" name="Oval 4"/>
+          <p:cNvSpPr/>
+          <p:nvPr/>
+        </p:nvSpPr>
+        <p:spPr>
+          <a:xfrm>
+            <a:off x="8245720" y="4269465"/>
+            <a:ext cx="914400" cy="914400"/>
+          </a:xfrm>
+          <a:prstGeom prst="ellipse">
+            <a:avLst/>
+          </a:prstGeom>
+        </p:spPr>
+        <p:style>
+          <a:lnRef idx="1">
+            <a:schemeClr val="accent1"/>
+          </a:lnRef>
+          <a:fillRef idx="3">
+            <a:schemeClr val="accent1"/>
+          </a:fillRef>
+          <a:effectRef idx="2">
+            <a:schemeClr val="accent1"/>
+          </a:effectRef>
+          <a:fontRef idx="minor">
+            <a:schemeClr val="lt1"/>
+          </a:fontRef>
+        </p:style>
+        <p:txBody>
+          <a:bodyPr rtlCol="0" anchor="ctr"/>
+          <a:lstStyle/>
+          <a:p>
+            <a:pPr algn="ctr"/>
+            <a:r>
+              <a:rPr lang="en-US" dirty="0" smtClean="0"/>
+              <a:t>13</a:t>
+            </a:r>
+            <a:endParaRPr lang="en-US" dirty="0"/>
+          </a:p>
+        </p:txBody>
+      </p:sp>
+      <p:sp>
+        <p:nvSpPr>
+          <p:cNvPr id="5" name="Oval 4"/>
+          <p:cNvSpPr/>
+          <p:nvPr/>
+        </p:nvSpPr>
+        <p:spPr>
+          <a:xfrm>
+            <a:off x="9044131" y="3177154"/>
+            <a:ext cx="914400" cy="914400"/>
+          </a:xfrm>
+          <a:prstGeom prst="ellipse">
+            <a:avLst/>
+          </a:prstGeom>
+        </p:spPr>
+        <p:style>
+          <a:lnRef idx="1">
+            <a:schemeClr val="accent1"/>
+          </a:lnRef>
+          <a:fillRef idx="3">
+            <a:schemeClr val="accent1"/>
+          </a:fillRef>
+          <a:effectRef idx="2">
+            <a:schemeClr val="accent1"/>
+          </a:effectRef>
+          <a:fontRef idx="minor">
+            <a:schemeClr val="lt1"/>
+          </a:fontRef>
+        </p:style>
+        <p:txBody>
+          <a:bodyPr rtlCol="0" anchor="ctr"/>
+          <a:lstStyle/>
+          <a:p>
+            <a:pPr algn="ctr"/>
+            <a:r>
+              <a:rPr lang="en-US" dirty="0" smtClean="0"/>
+              <a:t>14</a:t>
+            </a:r>
+            <a:endParaRPr lang="en-US" dirty="0"/>
+          </a:p>
+        </p:txBody>
+      </p:sp>
+      <p:sp>
+        <p:nvSpPr>
+          <p:cNvPr id="5" name="Oval 4"/>
+          <p:cNvSpPr/>
+          <p:nvPr/>
+        </p:nvSpPr>
+        <p:spPr>
+          <a:xfrm>
+            <a:off x="8410747" y="3639062"/>
+            <a:ext cx="914400" cy="914400"/>
+          </a:xfrm>
+          <a:prstGeom prst="ellipse">
+            <a:avLst/>
+          </a:prstGeom>
+        </p:spPr>
+        <p:style>
+          <a:lnRef idx="1">
+            <a:schemeClr val="accent1"/>
+          </a:lnRef>
+          <a:fillRef idx="3">
+            <a:schemeClr val="accent1"/>
+          </a:fillRef>
+          <a:effectRef idx="2">
+            <a:schemeClr val="accent1"/>
+          </a:effectRef>
+          <a:fontRef idx="minor">
+            <a:schemeClr val="lt1"/>
+          </a:fontRef>
+        </p:style>
+        <p:txBody>
+          <a:bodyPr rtlCol="0" anchor="ctr"/>
+          <a:lstStyle/>
+          <a:p>
+            <a:pPr algn="ctr"/>
+            <a:r>
+              <a:rPr lang="en-US" dirty="0" smtClean="0"/>
+              <a:t>15</a:t>
+            </a:r>
+            <a:endParaRPr lang="en-US" dirty="0"/>
+          </a:p>
+        </p:txBody>
+      </p:sp>
+      <p:sp>
+        <p:nvSpPr>
+          <p:cNvPr id="5" name="Oval 4"/>
+          <p:cNvSpPr/>
+          <p:nvPr/>
+        </p:nvSpPr>
+        <p:spPr>
+          <a:xfrm>
+            <a:off x="4119463" y="989573"/>
+            <a:ext cx="914400" cy="914400"/>
+          </a:xfrm>
+          <a:prstGeom prst="ellipse">
+            <a:avLst/>
+          </a:prstGeom>
+        </p:spPr>
+        <p:style>
+          <a:lnRef idx="1">
+            <a:schemeClr val="accent1"/>
+          </a:lnRef>
+          <a:fillRef idx="3">
+            <a:schemeClr val="accent1"/>
+          </a:fillRef>
+          <a:effectRef idx="2">
+            <a:schemeClr val="accent1"/>
+          </a:effectRef>
+          <a:fontRef idx="minor">
+            <a:schemeClr val="lt1"/>
+          </a:fontRef>
+        </p:style>
+        <p:txBody>
+          <a:bodyPr rtlCol="0" anchor="ctr"/>
+          <a:lstStyle/>
+          <a:p>
+            <a:pPr algn="ctr"/>
+            <a:r>
+              <a:rPr lang="en-US" dirty="0" smtClean="0"/>
+              <a:t>16</a:t>
+            </a:r>
+            <a:endParaRPr lang="en-US" dirty="0"/>
+          </a:p>
+        </p:txBody>
+      </p:sp>
+      <p:sp>
+        <p:nvSpPr>
+          <p:cNvPr id="5" name="Oval 4"/>
+          <p:cNvSpPr/>
+          <p:nvPr/>
+        </p:nvSpPr>
+        <p:spPr>
+          <a:xfrm>
+            <a:off x="7530603" y="4011975"/>
+            <a:ext cx="914400" cy="914400"/>
+          </a:xfrm>
+          <a:prstGeom prst="ellipse">
+            <a:avLst/>
+          </a:prstGeom>
+        </p:spPr>
+        <p:style>
+          <a:lnRef idx="1">
+            <a:schemeClr val="accent1"/>
+          </a:lnRef>
+          <a:fillRef idx="3">
+            <a:schemeClr val="accent1"/>
+          </a:fillRef>
+          <a:effectRef idx="2">
+            <a:schemeClr val="accent1"/>
+          </a:effectRef>
+          <a:fontRef idx="minor">
+            <a:schemeClr val="lt1"/>
+          </a:fontRef>
+        </p:style>
+        <p:txBody>
+          <a:bodyPr rtlCol="0" anchor="ctr"/>
+          <a:lstStyle/>
+          <a:p>
+            <a:pPr algn="ctr"/>
+            <a:r>
+              <a:rPr lang="en-US" dirty="0" smtClean="0"/>
+              <a:t>17</a:t>
+            </a:r>
+            <a:endParaRPr lang="en-US" dirty="0"/>
+          </a:p>
+        </p:txBody>
+      </p:sp>
+      <p:sp>
+        <p:nvSpPr>
+          <p:cNvPr id="5" name="Oval 4"/>
+          <p:cNvSpPr/>
+          <p:nvPr/>
+        </p:nvSpPr>
+        <p:spPr>
+          <a:xfrm>
+            <a:off x="2789854" y="1573677"/>
+            <a:ext cx="914400" cy="914400"/>
+          </a:xfrm>
+          <a:prstGeom prst="ellipse">
+            <a:avLst/>
+          </a:prstGeom>
+        </p:spPr>
+        <p:style>
+          <a:lnRef idx="1">
+            <a:schemeClr val="accent1"/>
+          </a:lnRef>
+          <a:fillRef idx="3">
+            <a:schemeClr val="accent1"/>
+          </a:fillRef>
+          <a:effectRef idx="2">
+            <a:schemeClr val="accent1"/>
+          </a:effectRef>
+          <a:fontRef idx="minor">
+            <a:schemeClr val="lt1"/>
+          </a:fontRef>
+        </p:style>
+        <p:txBody>
+          <a:bodyPr rtlCol="0" anchor="ctr"/>
+          <a:lstStyle/>
+          <a:p>
+            <a:pPr algn="ctr"/>
+            <a:r>
+              <a:rPr lang="en-US" dirty="0" smtClean="0"/>
+              <a:t>18</a:t>
+            </a:r>
+            <a:endParaRPr lang="en-US" dirty="0"/>
+          </a:p>
+        </p:txBody>
+      </p:sp>
+      <p:sp>
+        <p:nvSpPr>
+          <p:cNvPr id="5" name="Oval 4"/>
+          <p:cNvSpPr/>
+          <p:nvPr/>
+        </p:nvSpPr>
+        <p:spPr>
+          <a:xfrm>
+            <a:off x="1253086" y="5037513"/>
+            <a:ext cx="914400" cy="914400"/>
+          </a:xfrm>
+          <a:prstGeom prst="ellipse">
+            <a:avLst/>
+          </a:prstGeom>
+        </p:spPr>
+        <p:style>
+          <a:lnRef idx="1">
+            <a:schemeClr val="accent1"/>
+          </a:lnRef>
+          <a:fillRef idx="3">
+            <a:schemeClr val="accent1"/>
+          </a:fillRef>
+          <a:effectRef idx="2">
+            <a:schemeClr val="accent1"/>
+          </a:effectRef>
+          <a:fontRef idx="minor">
+            <a:schemeClr val="lt1"/>
+          </a:fontRef>
+        </p:style>
+        <p:txBody>
+          <a:bodyPr rtlCol="0" anchor="ctr"/>
+          <a:lstStyle/>
+          <a:p>
+            <a:pPr algn="ctr"/>
+            <a:r>
+              <a:rPr lang="en-US" dirty="0" smtClean="0"/>
+              <a:t>19</a:t>
             </a:r>
             <a:endParaRPr lang="en-US" dirty="0"/>
           </a:p>
@@ -4733,7 +4814,7 @@
     </p:spTree>
     <p:extLst>
       <p:ext uri="{BB962C8B-B14F-4D97-AF65-F5344CB8AC3E}">
-        <p14:creationId xmlns:p14="http://schemas.microsoft.com/office/powerpoint/2010/main" val="1917310340"/>
+        <p14:creationId xmlns:p14="http://schemas.microsoft.com/office/powerpoint/2010/main" val="1526452478"/>
       </p:ext>
     </p:extLst>
   </p:cSld>
@@ -4745,7 +4826,7 @@
 
 <file path=ppt/slides/slide4.xml><?xml version="1.0" encoding="utf-8"?>
 <p:sld xmlns:a="http://schemas.openxmlformats.org/drawingml/2006/main" xmlns:r="http://schemas.openxmlformats.org/officeDocument/2006/relationships" xmlns:p="http://schemas.openxmlformats.org/presentationml/2006/main">
-  <p:cSld>
+  <p:cSld name="Title and Content">
     <p:spTree>
       <p:nvGrpSpPr>
         <p:cNvPr id="1" name=""/>
@@ -4767,7 +4848,7 @@
             <a:spLocks noGrp="1"/>
           </p:cNvSpPr>
           <p:nvPr>
-            <p:ph type="ctrTitle"/>
+            <p:ph type="title"/>
           </p:nvPr>
         </p:nvSpPr>
         <p:spPr/>
@@ -4776,21 +4857,21 @@
           <a:lstStyle/>
           <a:p>
             <a:r>
-              <a:rPr lang="en-US" dirty="0" smtClean="0"/>
-              <a:t>This is the title</a:t>
-            </a:r>
-            <a:endParaRPr lang="en-US" dirty="0"/>
-          </a:p>
-        </p:txBody>
-      </p:sp>
-      <p:sp>
-        <p:nvSpPr>
-          <p:cNvPr id="3" name="Subtitle 2"/>
-          <p:cNvSpPr>
-            <a:spLocks noGrp="1"/>
-          </p:cNvSpPr>
-          <p:nvPr>
-            <p:ph type="subTitle" idx="1"/>
+              <a:rPr lang="en-US" smtClean="0"/>
+              <a:t>Click to edit Master title style</a:t>
+            </a:r>
+            <a:endParaRPr lang="en-US"/>
+          </a:p>
+        </p:txBody>
+      </p:sp>
+      <p:sp>
+        <p:nvSpPr>
+          <p:cNvPr id="3" name="Content Placeholder 2"/>
+          <p:cNvSpPr>
+            <a:spLocks noGrp="1"/>
+          </p:cNvSpPr>
+          <p:nvPr>
+            <p:ph idx="1"/>
           </p:nvPr>
         </p:nvSpPr>
         <p:spPr/>
@@ -4798,107 +4879,112 @@
           <a:bodyPr/>
           <a:lstStyle/>
           <a:p>
-            <a:r>
-              <a:rPr lang="en-US" dirty="0" smtClean="0"/>
-              <a:t>This is a subtitle</a:t>
-            </a:r>
-            <a:endParaRPr lang="en-US" dirty="0"/>
-          </a:p>
-        </p:txBody>
-      </p:sp>
-      <p:sp>
-        <p:nvSpPr>
-          <p:cNvPr id="4" name="TextBox 3"/>
-          <p:cNvSpPr txBox="1"/>
-          <p:nvPr/>
-        </p:nvSpPr>
-        <p:spPr>
-          <a:xfrm>
-            <a:off x="2260600" y="952500"/>
-            <a:ext cx="2540000" cy="738664"/>
-          </a:xfrm>
-          <a:prstGeom prst="rect">
-            <a:avLst/>
-          </a:prstGeom>
-          <a:noFill/>
-          <a:ln>
-            <a:solidFill>
-              <a:schemeClr val="tx1"/>
-            </a:solidFill>
-          </a:ln>
-        </p:spPr>
-        <p:txBody>
-          <a:bodyPr wrap="square" rtlCol="0">
-            <a:spAutoFit/>
-          </a:bodyPr>
-          <a:lstStyle/>
-          <a:p>
-            <a:r>
-              <a:rPr lang="en-US" sz="1400" b="1" dirty="0" smtClean="0">
-                <a:solidFill>
-                  <a:srgbClr val="FF0000"/>
-                </a:solidFill>
-                <a:latin typeface="Arial"/>
-                <a:cs typeface="Arial"/>
-              </a:rPr>
-              <a:t>Some random red bold Arial 14pt text with defined width and a border</a:t>
-            </a:r>
-            <a:endParaRPr lang="en-US" sz="1400" b="1" dirty="0">
-              <a:solidFill>
-                <a:srgbClr val="FF0000"/>
-              </a:solidFill>
-              <a:latin typeface="Arial"/>
-              <a:cs typeface="Arial"/>
-            </a:endParaRPr>
-          </a:p>
-        </p:txBody>
-      </p:sp>
-      <p:sp>
-        <p:nvSpPr>
-          <p:cNvPr id="5" name="Oval 4"/>
-          <p:cNvSpPr/>
-          <p:nvPr/>
-        </p:nvSpPr>
-        <p:spPr>
-          <a:xfrm>
-            <a:off x="6578600" y="787400"/>
-            <a:ext cx="1181100" cy="1181100"/>
-          </a:xfrm>
-          <a:prstGeom prst="ellipse">
-            <a:avLst/>
-          </a:prstGeom>
-        </p:spPr>
-        <p:style>
-          <a:lnRef idx="1">
-            <a:schemeClr val="accent1"/>
-          </a:lnRef>
-          <a:fillRef idx="3">
-            <a:schemeClr val="accent1"/>
-          </a:fillRef>
-          <a:effectRef idx="2">
-            <a:schemeClr val="accent1"/>
-          </a:effectRef>
-          <a:fontRef idx="minor">
-            <a:schemeClr val="lt1"/>
-          </a:fontRef>
-        </p:style>
-        <p:txBody>
-          <a:bodyPr rtlCol="0" anchor="ctr"/>
-          <a:lstStyle/>
-          <a:p>
-            <a:pPr algn="ctr"/>
-            <a:r>
-              <a:rPr lang="en-US" dirty="0" smtClean="0"/>
-              <a:t>A default circle</a:t>
-            </a:r>
-            <a:endParaRPr lang="en-US" dirty="0"/>
+            <a:pPr lvl="0"/>
+            <a:r>
+              <a:rPr lang="en-US" smtClean="0"/>
+              <a:t>Click to edit Master text styles</a:t>
+            </a:r>
+          </a:p>
+          <a:p>
+            <a:pPr lvl="1"/>
+            <a:r>
+              <a:rPr lang="en-US" smtClean="0"/>
+              <a:t>Second level</a:t>
+            </a:r>
+          </a:p>
+          <a:p>
+            <a:pPr lvl="2"/>
+            <a:r>
+              <a:rPr lang="en-US" smtClean="0"/>
+              <a:t>Third level</a:t>
+            </a:r>
+          </a:p>
+          <a:p>
+            <a:pPr lvl="3"/>
+            <a:r>
+              <a:rPr lang="en-US" smtClean="0"/>
+              <a:t>Fourth level</a:t>
+            </a:r>
+          </a:p>
+          <a:p>
+            <a:pPr lvl="4"/>
+            <a:r>
+              <a:rPr lang="en-US" smtClean="0"/>
+              <a:t>Fifth level</a:t>
+            </a:r>
+            <a:endParaRPr lang="en-US"/>
+          </a:p>
+        </p:txBody>
+      </p:sp>
+      <p:sp>
+        <p:nvSpPr>
+          <p:cNvPr id="4" name="Date Placeholder 3"/>
+          <p:cNvSpPr>
+            <a:spLocks noGrp="1"/>
+          </p:cNvSpPr>
+          <p:nvPr>
+            <p:ph type="dt" sz="half" idx="10"/>
+          </p:nvPr>
+        </p:nvSpPr>
+        <p:spPr/>
+        <p:txBody>
+          <a:bodyPr/>
+          <a:lstStyle/>
+          <a:p>
+            <a:fld id="{0F3294C6-1118-6C43-A700-8A6D5113A96D}" type="datetimeFigureOut">
+              <a:rPr lang="en-US" smtClean="0"/>
+              <a:t>7/21/15</a:t>
+            </a:fld>
+            <a:endParaRPr lang="en-US"/>
+          </a:p>
+        </p:txBody>
+      </p:sp>
+      <p:sp>
+        <p:nvSpPr>
+          <p:cNvPr id="5" name="Footer Placeholder 4"/>
+          <p:cNvSpPr>
+            <a:spLocks noGrp="1"/>
+          </p:cNvSpPr>
+          <p:nvPr>
+            <p:ph type="ftr" sz="quarter" idx="11"/>
+          </p:nvPr>
+        </p:nvSpPr>
+        <p:spPr/>
+        <p:txBody>
+          <a:bodyPr/>
+          <a:lstStyle/>
+          <a:p>
+            <a:endParaRPr lang="en-US"/>
+          </a:p>
+        </p:txBody>
+      </p:sp>
+      <p:sp>
+        <p:nvSpPr>
+          <p:cNvPr id="6" name="Slide Number Placeholder 5"/>
+          <p:cNvSpPr>
+            <a:spLocks noGrp="1"/>
+          </p:cNvSpPr>
+          <p:nvPr>
+            <p:ph type="sldNum" sz="quarter" idx="12"/>
+          </p:nvPr>
+        </p:nvSpPr>
+        <p:spPr/>
+        <p:txBody>
+          <a:bodyPr/>
+          <a:lstStyle/>
+          <a:p>
+            <a:fld id="{5E26C44E-ECEF-2947-849D-24D613C9A5C0}" type="slidenum">
+              <a:rPr lang="en-US" smtClean="0"/>
+              <a:t>‹#›</a:t>
+            </a:fld>
+            <a:endParaRPr lang="en-US"/>
           </a:p>
         </p:txBody>
       </p:sp>
     </p:spTree>
     <p:extLst>
       <p:ext uri="{BB962C8B-B14F-4D97-AF65-F5344CB8AC3E}">
-        <p14:creationId xmlns:p14="http://schemas.microsoft.com/office/powerpoint/2010/main" val="1917310340"/>
+        <p14:creationId xmlns:p14="http://schemas.microsoft.com/office/powerpoint/2010/main" val="1160378799"/>
       </p:ext>
     </p:extLst>
   </p:cSld>

</xml_diff>

<commit_message>
Successfully add multiple slides and charts
</commit_message>
<xml_diff>
--- a/test/files/parts3-a.pptx
+++ b/test/files/parts3-a.pptx
@@ -132,175 +132,177 @@
         <c:grouping val="clustered"/>
         <c:varyColors val="0"/>
         <c:ser>
-          <c:idx val="0"/>
-          <c:order val="0"/>
-          <c:tx>
-            <c:strRef>
-              <c:f>Sheet1!$B$1</c:f>
-              <c:strCache>
-                <c:ptCount val="1"/>
-                <c:pt idx="0">
-                  <c:v>Series 1</c:v>
-                </c:pt>
-              </c:strCache>
-            </c:strRef>
-          </c:tx>
-          <c:invertIfNegative val="0"/>
-          <c:cat>
-            <c:strRef>
-              <c:f>Sheet1!$A$2:$A$5</c:f>
-              <c:strCache>
-                <c:ptCount val="4"/>
-                <c:pt idx="0">
-                  <c:v>Category 1</c:v>
-                </c:pt>
-                <c:pt idx="1">
-                  <c:v>Category 2</c:v>
-                </c:pt>
-                <c:pt idx="2">
-                  <c:v>Category 3</c:v>
-                </c:pt>
-                <c:pt idx="3">
-                  <c:v>Category 4</c:v>
-                </c:pt>
-              </c:strCache>
-            </c:strRef>
-          </c:cat>
-          <c:val>
-            <c:numRef>
-              <c:f>Sheet1!$B$2:$B$5</c:f>
-              <c:numCache>
-                <c:formatCode>General</c:formatCode>
-                <c:ptCount val="4"/>
-                <c:pt idx="0">
-                  <c:v>4.3</c:v>
-                </c:pt>
-                <c:pt idx="1">
-                  <c:v>2.5</c:v>
-                </c:pt>
-                <c:pt idx="2">
-                  <c:v>3.5</c:v>
-                </c:pt>
-                <c:pt idx="3">
-                  <c:v>4.5</c:v>
-                </c:pt>
-              </c:numCache>
-            </c:numRef>
-          </c:val>
-        </c:ser>
-        <c:ser>
-          <c:idx val="1"/>
-          <c:order val="1"/>
-          <c:tx>
-            <c:strRef>
-              <c:f>Sheet1!$C$1</c:f>
-              <c:strCache>
-                <c:ptCount val="1"/>
-                <c:pt idx="0">
-                  <c:v>Series 2</c:v>
-                </c:pt>
-              </c:strCache>
-            </c:strRef>
-          </c:tx>
-          <c:invertIfNegative val="0"/>
-          <c:cat>
-            <c:strRef>
-              <c:f>Sheet1!$A$2:$A$5</c:f>
-              <c:strCache>
-                <c:ptCount val="4"/>
-                <c:pt idx="0">
-                  <c:v>Category 1</c:v>
-                </c:pt>
-                <c:pt idx="1">
-                  <c:v>Category 2</c:v>
-                </c:pt>
-                <c:pt idx="2">
-                  <c:v>Category 3</c:v>
-                </c:pt>
-                <c:pt idx="3">
-                  <c:v>Category 4</c:v>
-                </c:pt>
-              </c:strCache>
-            </c:strRef>
-          </c:cat>
-          <c:val>
-            <c:numRef>
-              <c:f>Sheet1!$C$2:$C$5</c:f>
-              <c:numCache>
-                <c:formatCode>General</c:formatCode>
-                <c:ptCount val="4"/>
-                <c:pt idx="0">
-                  <c:v>2.4</c:v>
-                </c:pt>
-                <c:pt idx="1">
-                  <c:v>4.4</c:v>
-                </c:pt>
-                <c:pt idx="2">
-                  <c:v>1.8</c:v>
-                </c:pt>
-                <c:pt idx="3">
-                  <c:v>2.8</c:v>
-                </c:pt>
-              </c:numCache>
-            </c:numRef>
-          </c:val>
-        </c:ser>
-        <c:ser>
-          <c:idx val="2"/>
-          <c:order val="2"/>
-          <c:tx>
-            <c:strRef>
-              <c:f>Sheet1!$D$1</c:f>
-              <c:strCache>
-                <c:ptCount val="1"/>
-                <c:pt idx="0">
-                  <c:v>Series 3</c:v>
-                </c:pt>
-              </c:strCache>
-            </c:strRef>
-          </c:tx>
-          <c:invertIfNegative val="0"/>
-          <c:cat>
-            <c:strRef>
-              <c:f>Sheet1!$A$2:$A$5</c:f>
-              <c:strCache>
-                <c:ptCount val="4"/>
-                <c:pt idx="0">
-                  <c:v>Category 1</c:v>
-                </c:pt>
-                <c:pt idx="1">
-                  <c:v>Category 2</c:v>
-                </c:pt>
-                <c:pt idx="2">
-                  <c:v>Category 3</c:v>
-                </c:pt>
-                <c:pt idx="3">
-                  <c:v>Category 4</c:v>
-                </c:pt>
-              </c:strCache>
-            </c:strRef>
-          </c:cat>
-          <c:val>
-            <c:numRef>
-              <c:f>Sheet1!$D$2:$D$5</c:f>
-              <c:numCache>
-                <c:formatCode>General</c:formatCode>
-                <c:ptCount val="4"/>
-                <c:pt idx="0">
-                  <c:v>2.0</c:v>
-                </c:pt>
-                <c:pt idx="1">
-                  <c:v>2.0</c:v>
-                </c:pt>
-                <c:pt idx="2">
-                  <c:v>3.0</c:v>
-                </c:pt>
-                <c:pt idx="3">
-                  <c:v>5.0</c:v>
-                </c:pt>
-              </c:numCache>
-            </c:numRef>
-          </c:val>
+          <c:ser>
+            <c:idx val="0"/>
+            <c:order val="0"/>
+            <c:tx>
+              <c:strRef>
+                <c:f>Sheet1!$B$1</c:f>
+                <c:strCache>
+                  <c:ptCount val="1"/>
+                  <c:pt idx="0">
+                    <c:v>Series 1</c:v>
+                  </c:pt>
+                </c:strCache>
+              </c:strRef>
+            </c:tx>
+            <c:invertIfNegative val="0"/>
+            <c:cat>
+              <c:strRef>
+                <c:f>Sheet1!$A$2:$A$5</c:f>
+                <c:strCache>
+                  <c:ptCount val="4"/>
+                  <c:pt idx="0">
+                    <c:v>Category 1</c:v>
+                  </c:pt>
+                  <c:pt idx="1">
+                    <c:v>Category 2</c:v>
+                  </c:pt>
+                  <c:pt idx="2">
+                    <c:v>Category 3</c:v>
+                  </c:pt>
+                  <c:pt idx="3">
+                    <c:v>Category 4</c:v>
+                  </c:pt>
+                </c:strCache>
+              </c:strRef>
+            </c:cat>
+            <c:val>
+              <c:numRef>
+                <c:f>Sheet1!$B$2:$B$5</c:f>
+                <c:numCache>
+                  <c:formatCode>General</c:formatCode>
+                  <c:ptCount val="4"/>
+                  <c:pt idx="0">
+                    <c:v>4.3</c:v>
+                  </c:pt>
+                  <c:pt idx="1">
+                    <c:v>2.5</c:v>
+                  </c:pt>
+                  <c:pt idx="2">
+                    <c:v>3.5</c:v>
+                  </c:pt>
+                  <c:pt idx="3">
+                    <c:v>4.5</c:v>
+                  </c:pt>
+                </c:numCache>
+              </c:numRef>
+            </c:val>
+          </c:ser>
+          <c:ser>
+            <c:idx val="1"/>
+            <c:order val="1"/>
+            <c:tx>
+              <c:strRef>
+                <c:f>Sheet1!$C$1</c:f>
+                <c:strCache>
+                  <c:ptCount val="1"/>
+                  <c:pt idx="0">
+                    <c:v>Series 2</c:v>
+                  </c:pt>
+                </c:strCache>
+              </c:strRef>
+            </c:tx>
+            <c:invertIfNegative val="0"/>
+            <c:cat>
+              <c:strRef>
+                <c:f>Sheet1!$A$2:$A$5</c:f>
+                <c:strCache>
+                  <c:ptCount val="4"/>
+                  <c:pt idx="0">
+                    <c:v>Category 1</c:v>
+                  </c:pt>
+                  <c:pt idx="1">
+                    <c:v>Category 2</c:v>
+                  </c:pt>
+                  <c:pt idx="2">
+                    <c:v>Category 3</c:v>
+                  </c:pt>
+                  <c:pt idx="3">
+                    <c:v>Category 4</c:v>
+                  </c:pt>
+                </c:strCache>
+              </c:strRef>
+            </c:cat>
+            <c:val>
+              <c:numRef>
+                <c:f>Sheet1!$C$2:$C$5</c:f>
+                <c:numCache>
+                  <c:formatCode>General</c:formatCode>
+                  <c:ptCount val="4"/>
+                  <c:pt idx="0">
+                    <c:v>2.4</c:v>
+                  </c:pt>
+                  <c:pt idx="1">
+                    <c:v>4.4</c:v>
+                  </c:pt>
+                  <c:pt idx="2">
+                    <c:v>1.8</c:v>
+                  </c:pt>
+                  <c:pt idx="3">
+                    <c:v>2.8</c:v>
+                  </c:pt>
+                </c:numCache>
+              </c:numRef>
+            </c:val>
+          </c:ser>
+          <c:ser>
+            <c:idx val="2"/>
+            <c:order val="2"/>
+            <c:tx>
+              <c:strRef>
+                <c:f>Sheet1!$D$1</c:f>
+                <c:strCache>
+                  <c:ptCount val="1"/>
+                  <c:pt idx="0">
+                    <c:v>Series 3</c:v>
+                  </c:pt>
+                </c:strCache>
+              </c:strRef>
+            </c:tx>
+            <c:invertIfNegative val="0"/>
+            <c:cat>
+              <c:strRef>
+                <c:f>Sheet1!$A$2:$A$5</c:f>
+                <c:strCache>
+                  <c:ptCount val="4"/>
+                  <c:pt idx="0">
+                    <c:v>Category 1</c:v>
+                  </c:pt>
+                  <c:pt idx="1">
+                    <c:v>Category 2</c:v>
+                  </c:pt>
+                  <c:pt idx="2">
+                    <c:v>Category 3</c:v>
+                  </c:pt>
+                  <c:pt idx="3">
+                    <c:v>Category 4</c:v>
+                  </c:pt>
+                </c:strCache>
+              </c:strRef>
+            </c:cat>
+            <c:val>
+              <c:numRef>
+                <c:f>Sheet1!$D$2:$D$5</c:f>
+                <c:numCache>
+                  <c:formatCode>General</c:formatCode>
+                  <c:ptCount val="4"/>
+                  <c:pt idx="0">
+                    <c:v>2</c:v>
+                  </c:pt>
+                  <c:pt idx="1">
+                    <c:v>2</c:v>
+                  </c:pt>
+                  <c:pt idx="2">
+                    <c:v>3</c:v>
+                  </c:pt>
+                  <c:pt idx="3">
+                    <c:v>5</c:v>
+                  </c:pt>
+                </c:numCache>
+              </c:numRef>
+            </c:val>
+          </c:ser>
         </c:ser>
         <c:dLbls>
           <c:showLegendKey val="0"/>
@@ -3545,7 +3547,7 @@
           <p:nvPr>
             <p:extLst>
               <p:ext uri="{D42A27DB-BD31-4B8C-83A1-F6EECF244321}">
-                <p14:modId xmlns:p14="http://schemas.microsoft.com/office/powerpoint/2010/main" val="3543180680"/>
+                <p14:modId xmlns:p14="http://schemas.microsoft.com/office/powerpoint/2010/main" val="2230441993"/>
               </p:ext>
             </p:extLst>
           </p:nvPr>
@@ -3979,7 +3981,7 @@
         </p:nvSpPr>
         <p:spPr>
           <a:xfrm>
-            <a:off x="6540895" y="5404566"/>
+            <a:off x="4334433" y="4054748"/>
             <a:ext cx="914400" cy="914400"/>
           </a:xfrm>
           <a:prstGeom prst="ellipse">
@@ -4021,7 +4023,7 @@
         </p:nvSpPr>
         <p:spPr>
           <a:xfrm>
-            <a:off x="4660866" y="585011"/>
+            <a:off x="6278577" y="3317"/>
             <a:ext cx="914400" cy="914400"/>
           </a:xfrm>
           <a:prstGeom prst="ellipse">
@@ -4063,7 +4065,7 @@
         </p:nvSpPr>
         <p:spPr>
           <a:xfrm>
-            <a:off x="5149932" y="2294041"/>
+            <a:off x="599713" y="2112737"/>
             <a:ext cx="914400" cy="914400"/>
           </a:xfrm>
           <a:prstGeom prst="ellipse">
@@ -4105,7 +4107,7 @@
         </p:nvSpPr>
         <p:spPr>
           <a:xfrm>
-            <a:off x="4464530" y="3529929"/>
+            <a:off x="6362880" y="1709094"/>
             <a:ext cx="914400" cy="914400"/>
           </a:xfrm>
           <a:prstGeom prst="ellipse">
@@ -4147,7 +4149,7 @@
         </p:nvSpPr>
         <p:spPr>
           <a:xfrm>
-            <a:off x="6801935" y="4620667"/>
+            <a:off x="3501950" y="43387"/>
             <a:ext cx="914400" cy="914400"/>
           </a:xfrm>
           <a:prstGeom prst="ellipse">
@@ -4189,7 +4191,7 @@
         </p:nvSpPr>
         <p:spPr>
           <a:xfrm>
-            <a:off x="5588121" y="713905"/>
+            <a:off x="4915321" y="2243305"/>
             <a:ext cx="914400" cy="914400"/>
           </a:xfrm>
           <a:prstGeom prst="ellipse">
@@ -4231,7 +4233,7 @@
         </p:nvSpPr>
         <p:spPr>
           <a:xfrm>
-            <a:off x="6413478" y="2487960"/>
+            <a:off x="4698486" y="1253185"/>
             <a:ext cx="914400" cy="914400"/>
           </a:xfrm>
           <a:prstGeom prst="ellipse">
@@ -4273,7 +4275,7 @@
         </p:nvSpPr>
         <p:spPr>
           <a:xfrm>
-            <a:off x="5135605" y="4367096"/>
+            <a:off x="7841207" y="2230465"/>
             <a:ext cx="914400" cy="914400"/>
           </a:xfrm>
           <a:prstGeom prst="ellipse">
@@ -4315,7 +4317,7 @@
         </p:nvSpPr>
         <p:spPr>
           <a:xfrm>
-            <a:off x="26107" y="1986127"/>
+            <a:off x="8622784" y="2345103"/>
             <a:ext cx="914400" cy="914400"/>
           </a:xfrm>
           <a:prstGeom prst="ellipse">
@@ -4357,7 +4359,7 @@
         </p:nvSpPr>
         <p:spPr>
           <a:xfrm>
-            <a:off x="7478627" y="326057"/>
+            <a:off x="6187639" y="661514"/>
             <a:ext cx="914400" cy="914400"/>
           </a:xfrm>
           <a:prstGeom prst="ellipse">
@@ -4399,7 +4401,7 @@
         </p:nvSpPr>
         <p:spPr>
           <a:xfrm>
-            <a:off x="8852638" y="3036884"/>
+            <a:off x="1608811" y="4787695"/>
             <a:ext cx="914400" cy="914400"/>
           </a:xfrm>
           <a:prstGeom prst="ellipse">
@@ -4441,7 +4443,7 @@
         </p:nvSpPr>
         <p:spPr>
           <a:xfrm>
-            <a:off x="8083324" y="2937457"/>
+            <a:off x="6458902" y="1526657"/>
             <a:ext cx="914400" cy="914400"/>
           </a:xfrm>
           <a:prstGeom prst="ellipse">
@@ -4483,7 +4485,7 @@
         </p:nvSpPr>
         <p:spPr>
           <a:xfrm>
-            <a:off x="5649319" y="2459254"/>
+            <a:off x="7577822" y="1535296"/>
             <a:ext cx="914400" cy="914400"/>
           </a:xfrm>
           <a:prstGeom prst="ellipse">
@@ -4525,7 +4527,7 @@
         </p:nvSpPr>
         <p:spPr>
           <a:xfrm>
-            <a:off x="8245720" y="4269465"/>
+            <a:off x="5319101" y="2199684"/>
             <a:ext cx="914400" cy="914400"/>
           </a:xfrm>
           <a:prstGeom prst="ellipse">
@@ -4567,7 +4569,7 @@
         </p:nvSpPr>
         <p:spPr>
           <a:xfrm>
-            <a:off x="9044131" y="3177154"/>
+            <a:off x="2367488" y="1069391"/>
             <a:ext cx="914400" cy="914400"/>
           </a:xfrm>
           <a:prstGeom prst="ellipse">
@@ -4609,7 +4611,7 @@
         </p:nvSpPr>
         <p:spPr>
           <a:xfrm>
-            <a:off x="8410747" y="3639062"/>
+            <a:off x="7023366" y="1155450"/>
             <a:ext cx="914400" cy="914400"/>
           </a:xfrm>
           <a:prstGeom prst="ellipse">
@@ -4651,7 +4653,7 @@
         </p:nvSpPr>
         <p:spPr>
           <a:xfrm>
-            <a:off x="4119463" y="989573"/>
+            <a:off x="4946636" y="1101530"/>
             <a:ext cx="914400" cy="914400"/>
           </a:xfrm>
           <a:prstGeom prst="ellipse">
@@ -4693,7 +4695,7 @@
         </p:nvSpPr>
         <p:spPr>
           <a:xfrm>
-            <a:off x="7530603" y="4011975"/>
+            <a:off x="5818100" y="2485195"/>
             <a:ext cx="914400" cy="914400"/>
           </a:xfrm>
           <a:prstGeom prst="ellipse">
@@ -4735,7 +4737,7 @@
         </p:nvSpPr>
         <p:spPr>
           <a:xfrm>
-            <a:off x="2789854" y="1573677"/>
+            <a:off x="3129982" y="3856736"/>
             <a:ext cx="914400" cy="914400"/>
           </a:xfrm>
           <a:prstGeom prst="ellipse">
@@ -4777,7 +4779,7 @@
         </p:nvSpPr>
         <p:spPr>
           <a:xfrm>
-            <a:off x="1253086" y="5037513"/>
+            <a:off x="2116760" y="1276555"/>
             <a:ext cx="914400" cy="914400"/>
           </a:xfrm>
           <a:prstGeom prst="ellipse">

</xml_diff>

<commit_message>
Extract data into JSON starter object
</commit_message>
<xml_diff>
--- a/test/files/parts3-a.pptx
+++ b/test/files/parts3-a.pptx
@@ -132,177 +132,175 @@
         <c:grouping val="clustered"/>
         <c:varyColors val="0"/>
         <c:ser>
-          <c:ser>
-            <c:idx val="0"/>
-            <c:order val="0"/>
-            <c:tx>
-              <c:strRef>
-                <c:f>Sheet1!$B$1</c:f>
-                <c:strCache>
-                  <c:ptCount val="1"/>
-                  <c:pt idx="0">
-                    <c:v>Series 1</c:v>
-                  </c:pt>
-                </c:strCache>
-              </c:strRef>
-            </c:tx>
-            <c:invertIfNegative val="0"/>
-            <c:cat>
-              <c:strRef>
-                <c:f>Sheet1!$A$2:$A$5</c:f>
-                <c:strCache>
-                  <c:ptCount val="4"/>
-                  <c:pt idx="0">
-                    <c:v>Category 1</c:v>
-                  </c:pt>
-                  <c:pt idx="1">
-                    <c:v>Category 2</c:v>
-                  </c:pt>
-                  <c:pt idx="2">
-                    <c:v>Category 3</c:v>
-                  </c:pt>
-                  <c:pt idx="3">
-                    <c:v>Category 4</c:v>
-                  </c:pt>
-                </c:strCache>
-              </c:strRef>
-            </c:cat>
-            <c:val>
-              <c:numRef>
-                <c:f>Sheet1!$B$2:$B$5</c:f>
-                <c:numCache>
-                  <c:formatCode>General</c:formatCode>
-                  <c:ptCount val="4"/>
-                  <c:pt idx="0">
-                    <c:v>4.3</c:v>
-                  </c:pt>
-                  <c:pt idx="1">
-                    <c:v>2.5</c:v>
-                  </c:pt>
-                  <c:pt idx="2">
-                    <c:v>3.5</c:v>
-                  </c:pt>
-                  <c:pt idx="3">
-                    <c:v>4.5</c:v>
-                  </c:pt>
-                </c:numCache>
-              </c:numRef>
-            </c:val>
-          </c:ser>
-          <c:ser>
-            <c:idx val="1"/>
-            <c:order val="1"/>
-            <c:tx>
-              <c:strRef>
-                <c:f>Sheet1!$C$1</c:f>
-                <c:strCache>
-                  <c:ptCount val="1"/>
-                  <c:pt idx="0">
-                    <c:v>Series 2</c:v>
-                  </c:pt>
-                </c:strCache>
-              </c:strRef>
-            </c:tx>
-            <c:invertIfNegative val="0"/>
-            <c:cat>
-              <c:strRef>
-                <c:f>Sheet1!$A$2:$A$5</c:f>
-                <c:strCache>
-                  <c:ptCount val="4"/>
-                  <c:pt idx="0">
-                    <c:v>Category 1</c:v>
-                  </c:pt>
-                  <c:pt idx="1">
-                    <c:v>Category 2</c:v>
-                  </c:pt>
-                  <c:pt idx="2">
-                    <c:v>Category 3</c:v>
-                  </c:pt>
-                  <c:pt idx="3">
-                    <c:v>Category 4</c:v>
-                  </c:pt>
-                </c:strCache>
-              </c:strRef>
-            </c:cat>
-            <c:val>
-              <c:numRef>
-                <c:f>Sheet1!$C$2:$C$5</c:f>
-                <c:numCache>
-                  <c:formatCode>General</c:formatCode>
-                  <c:ptCount val="4"/>
-                  <c:pt idx="0">
-                    <c:v>2.4</c:v>
-                  </c:pt>
-                  <c:pt idx="1">
-                    <c:v>4.4</c:v>
-                  </c:pt>
-                  <c:pt idx="2">
-                    <c:v>1.8</c:v>
-                  </c:pt>
-                  <c:pt idx="3">
-                    <c:v>2.8</c:v>
-                  </c:pt>
-                </c:numCache>
-              </c:numRef>
-            </c:val>
-          </c:ser>
-          <c:ser>
-            <c:idx val="2"/>
-            <c:order val="2"/>
-            <c:tx>
-              <c:strRef>
-                <c:f>Sheet1!$D$1</c:f>
-                <c:strCache>
-                  <c:ptCount val="1"/>
-                  <c:pt idx="0">
-                    <c:v>Series 3</c:v>
-                  </c:pt>
-                </c:strCache>
-              </c:strRef>
-            </c:tx>
-            <c:invertIfNegative val="0"/>
-            <c:cat>
-              <c:strRef>
-                <c:f>Sheet1!$A$2:$A$5</c:f>
-                <c:strCache>
-                  <c:ptCount val="4"/>
-                  <c:pt idx="0">
-                    <c:v>Category 1</c:v>
-                  </c:pt>
-                  <c:pt idx="1">
-                    <c:v>Category 2</c:v>
-                  </c:pt>
-                  <c:pt idx="2">
-                    <c:v>Category 3</c:v>
-                  </c:pt>
-                  <c:pt idx="3">
-                    <c:v>Category 4</c:v>
-                  </c:pt>
-                </c:strCache>
-              </c:strRef>
-            </c:cat>
-            <c:val>
-              <c:numRef>
-                <c:f>Sheet1!$D$2:$D$5</c:f>
-                <c:numCache>
-                  <c:formatCode>General</c:formatCode>
-                  <c:ptCount val="4"/>
-                  <c:pt idx="0">
-                    <c:v>2</c:v>
-                  </c:pt>
-                  <c:pt idx="1">
-                    <c:v>2</c:v>
-                  </c:pt>
-                  <c:pt idx="2">
-                    <c:v>3</c:v>
-                  </c:pt>
-                  <c:pt idx="3">
-                    <c:v>5</c:v>
-                  </c:pt>
-                </c:numCache>
-              </c:numRef>
-            </c:val>
-          </c:ser>
+          <c:idx val="0"/>
+          <c:order val="0"/>
+          <c:tx>
+            <c:strRef>
+              <c:f>Sheet1!$B$1</c:f>
+              <c:strCache>
+                <c:ptCount val="1"/>
+                <c:pt idx="0">
+                  <c:v>Series 1</c:v>
+                </c:pt>
+              </c:strCache>
+            </c:strRef>
+          </c:tx>
+          <c:invertIfNegative val="0"/>
+          <c:cat>
+            <c:strRef>
+              <c:f>Sheet1!$A$2:$A$5</c:f>
+              <c:strCache>
+                <c:ptCount val="4"/>
+                <c:pt idx="0">
+                  <c:v>Category 1</c:v>
+                </c:pt>
+                <c:pt idx="1">
+                  <c:v>Category 2</c:v>
+                </c:pt>
+                <c:pt idx="2">
+                  <c:v>Category 3</c:v>
+                </c:pt>
+                <c:pt idx="3">
+                  <c:v>Category 4</c:v>
+                </c:pt>
+              </c:strCache>
+            </c:strRef>
+          </c:cat>
+          <c:val>
+            <c:numRef>
+              <c:f>Sheet1!$B$2:$B$5</c:f>
+              <c:numCache>
+                <c:formatCode>General</c:formatCode>
+                <c:ptCount val="4"/>
+                <c:pt idx="0">
+                  <c:v>4.3</c:v>
+                </c:pt>
+                <c:pt idx="1">
+                  <c:v>2.5</c:v>
+                </c:pt>
+                <c:pt idx="2">
+                  <c:v>3.5</c:v>
+                </c:pt>
+                <c:pt idx="3">
+                  <c:v>4.5</c:v>
+                </c:pt>
+              </c:numCache>
+            </c:numRef>
+          </c:val>
+        </c:ser>
+        <c:ser>
+          <c:idx val="1"/>
+          <c:order val="1"/>
+          <c:tx>
+            <c:strRef>
+              <c:f>Sheet1!$C$1</c:f>
+              <c:strCache>
+                <c:ptCount val="1"/>
+                <c:pt idx="0">
+                  <c:v>Series 2</c:v>
+                </c:pt>
+              </c:strCache>
+            </c:strRef>
+          </c:tx>
+          <c:invertIfNegative val="0"/>
+          <c:cat>
+            <c:strRef>
+              <c:f>Sheet1!$A$2:$A$5</c:f>
+              <c:strCache>
+                <c:ptCount val="4"/>
+                <c:pt idx="0">
+                  <c:v>Category 1</c:v>
+                </c:pt>
+                <c:pt idx="1">
+                  <c:v>Category 2</c:v>
+                </c:pt>
+                <c:pt idx="2">
+                  <c:v>Category 3</c:v>
+                </c:pt>
+                <c:pt idx="3">
+                  <c:v>Category 4</c:v>
+                </c:pt>
+              </c:strCache>
+            </c:strRef>
+          </c:cat>
+          <c:val>
+            <c:numRef>
+              <c:f>Sheet1!$C$2:$C$5</c:f>
+              <c:numCache>
+                <c:formatCode>General</c:formatCode>
+                <c:ptCount val="4"/>
+                <c:pt idx="0">
+                  <c:v>2.4</c:v>
+                </c:pt>
+                <c:pt idx="1">
+                  <c:v>4.4</c:v>
+                </c:pt>
+                <c:pt idx="2">
+                  <c:v>1.8</c:v>
+                </c:pt>
+                <c:pt idx="3">
+                  <c:v>2.8</c:v>
+                </c:pt>
+              </c:numCache>
+            </c:numRef>
+          </c:val>
+        </c:ser>
+        <c:ser>
+          <c:idx val="2"/>
+          <c:order val="2"/>
+          <c:tx>
+            <c:strRef>
+              <c:f>Sheet1!$D$1</c:f>
+              <c:strCache>
+                <c:ptCount val="1"/>
+                <c:pt idx="0">
+                  <c:v>Series 3</c:v>
+                </c:pt>
+              </c:strCache>
+            </c:strRef>
+          </c:tx>
+          <c:invertIfNegative val="0"/>
+          <c:cat>
+            <c:strRef>
+              <c:f>Sheet1!$A$2:$A$5</c:f>
+              <c:strCache>
+                <c:ptCount val="4"/>
+                <c:pt idx="0">
+                  <c:v>Category 1</c:v>
+                </c:pt>
+                <c:pt idx="1">
+                  <c:v>Category 2</c:v>
+                </c:pt>
+                <c:pt idx="2">
+                  <c:v>Category 3</c:v>
+                </c:pt>
+                <c:pt idx="3">
+                  <c:v>Category 4</c:v>
+                </c:pt>
+              </c:strCache>
+            </c:strRef>
+          </c:cat>
+          <c:val>
+            <c:numRef>
+              <c:f>Sheet1!$D$2:$D$5</c:f>
+              <c:numCache>
+                <c:formatCode>General</c:formatCode>
+                <c:ptCount val="4"/>
+                <c:pt idx="0">
+                  <c:v>2</c:v>
+                </c:pt>
+                <c:pt idx="1">
+                  <c:v>2</c:v>
+                </c:pt>
+                <c:pt idx="2">
+                  <c:v>3</c:v>
+                </c:pt>
+                <c:pt idx="3">
+                  <c:v>5</c:v>
+                </c:pt>
+              </c:numCache>
+            </c:numRef>
+          </c:val>
         </c:ser>
         <c:dLbls>
           <c:showLegendKey val="0"/>
@@ -3547,7 +3545,7 @@
           <p:nvPr>
             <p:extLst>
               <p:ext uri="{D42A27DB-BD31-4B8C-83A1-F6EECF244321}">
-                <p14:modId xmlns:p14="http://schemas.microsoft.com/office/powerpoint/2010/main" val="2230441993"/>
+                <p14:modId xmlns:p14="http://schemas.microsoft.com/office/powerpoint/2010/main" val="2424243990"/>
               </p:ext>
             </p:extLst>
           </p:nvPr>
@@ -3981,7 +3979,7 @@
         </p:nvSpPr>
         <p:spPr>
           <a:xfrm>
-            <a:off x="4334433" y="4054748"/>
+            <a:off x="642422" y="4154614"/>
             <a:ext cx="914400" cy="914400"/>
           </a:xfrm>
           <a:prstGeom prst="ellipse">
@@ -4023,7 +4021,7 @@
         </p:nvSpPr>
         <p:spPr>
           <a:xfrm>
-            <a:off x="6278577" y="3317"/>
+            <a:off x="1928541" y="627801"/>
             <a:ext cx="914400" cy="914400"/>
           </a:xfrm>
           <a:prstGeom prst="ellipse">
@@ -4065,7 +4063,7 @@
         </p:nvSpPr>
         <p:spPr>
           <a:xfrm>
-            <a:off x="599713" y="2112737"/>
+            <a:off x="8768065" y="3300712"/>
             <a:ext cx="914400" cy="914400"/>
           </a:xfrm>
           <a:prstGeom prst="ellipse">
@@ -4107,7 +4105,7 @@
         </p:nvSpPr>
         <p:spPr>
           <a:xfrm>
-            <a:off x="6362880" y="1709094"/>
+            <a:off x="4164101" y="2122151"/>
             <a:ext cx="914400" cy="914400"/>
           </a:xfrm>
           <a:prstGeom prst="ellipse">
@@ -4149,7 +4147,7 @@
         </p:nvSpPr>
         <p:spPr>
           <a:xfrm>
-            <a:off x="3501950" y="43387"/>
+            <a:off x="300027" y="3177418"/>
             <a:ext cx="914400" cy="914400"/>
           </a:xfrm>
           <a:prstGeom prst="ellipse">
@@ -4191,7 +4189,7 @@
         </p:nvSpPr>
         <p:spPr>
           <a:xfrm>
-            <a:off x="4915321" y="2243305"/>
+            <a:off x="4477294" y="1865791"/>
             <a:ext cx="914400" cy="914400"/>
           </a:xfrm>
           <a:prstGeom prst="ellipse">
@@ -4233,7 +4231,7 @@
         </p:nvSpPr>
         <p:spPr>
           <a:xfrm>
-            <a:off x="4698486" y="1253185"/>
+            <a:off x="2594457" y="2993011"/>
             <a:ext cx="914400" cy="914400"/>
           </a:xfrm>
           <a:prstGeom prst="ellipse">
@@ -4275,7 +4273,7 @@
         </p:nvSpPr>
         <p:spPr>
           <a:xfrm>
-            <a:off x="7841207" y="2230465"/>
+            <a:off x="5390212" y="3704263"/>
             <a:ext cx="914400" cy="914400"/>
           </a:xfrm>
           <a:prstGeom prst="ellipse">
@@ -4317,7 +4315,7 @@
         </p:nvSpPr>
         <p:spPr>
           <a:xfrm>
-            <a:off x="8622784" y="2345103"/>
+            <a:off x="5140590" y="4912792"/>
             <a:ext cx="914400" cy="914400"/>
           </a:xfrm>
           <a:prstGeom prst="ellipse">
@@ -4359,7 +4357,7 @@
         </p:nvSpPr>
         <p:spPr>
           <a:xfrm>
-            <a:off x="6187639" y="661514"/>
+            <a:off x="5995820" y="4763614"/>
             <a:ext cx="914400" cy="914400"/>
           </a:xfrm>
           <a:prstGeom prst="ellipse">
@@ -4401,7 +4399,7 @@
         </p:nvSpPr>
         <p:spPr>
           <a:xfrm>
-            <a:off x="1608811" y="4787695"/>
+            <a:off x="7476869" y="3159454"/>
             <a:ext cx="914400" cy="914400"/>
           </a:xfrm>
           <a:prstGeom prst="ellipse">
@@ -4443,7 +4441,7 @@
         </p:nvSpPr>
         <p:spPr>
           <a:xfrm>
-            <a:off x="6458902" y="1526657"/>
+            <a:off x="367436" y="1666624"/>
             <a:ext cx="914400" cy="914400"/>
           </a:xfrm>
           <a:prstGeom prst="ellipse">
@@ -4485,7 +4483,7 @@
         </p:nvSpPr>
         <p:spPr>
           <a:xfrm>
-            <a:off x="7577822" y="1535296"/>
+            <a:off x="7648666" y="3569663"/>
             <a:ext cx="914400" cy="914400"/>
           </a:xfrm>
           <a:prstGeom prst="ellipse">
@@ -4527,7 +4525,7 @@
         </p:nvSpPr>
         <p:spPr>
           <a:xfrm>
-            <a:off x="5319101" y="2199684"/>
+            <a:off x="2581295" y="2319033"/>
             <a:ext cx="914400" cy="914400"/>
           </a:xfrm>
           <a:prstGeom prst="ellipse">
@@ -4569,7 +4567,7 @@
         </p:nvSpPr>
         <p:spPr>
           <a:xfrm>
-            <a:off x="2367488" y="1069391"/>
+            <a:off x="7116277" y="5326177"/>
             <a:ext cx="914400" cy="914400"/>
           </a:xfrm>
           <a:prstGeom prst="ellipse">
@@ -4611,7 +4609,7 @@
         </p:nvSpPr>
         <p:spPr>
           <a:xfrm>
-            <a:off x="7023366" y="1155450"/>
+            <a:off x="5012130" y="993644"/>
             <a:ext cx="914400" cy="914400"/>
           </a:xfrm>
           <a:prstGeom prst="ellipse">
@@ -4653,7 +4651,7 @@
         </p:nvSpPr>
         <p:spPr>
           <a:xfrm>
-            <a:off x="4946636" y="1101530"/>
+            <a:off x="4692217" y="3389675"/>
             <a:ext cx="914400" cy="914400"/>
           </a:xfrm>
           <a:prstGeom prst="ellipse">
@@ -4695,7 +4693,7 @@
         </p:nvSpPr>
         <p:spPr>
           <a:xfrm>
-            <a:off x="5818100" y="2485195"/>
+            <a:off x="6591537" y="2022858"/>
             <a:ext cx="914400" cy="914400"/>
           </a:xfrm>
           <a:prstGeom prst="ellipse">
@@ -4737,7 +4735,7 @@
         </p:nvSpPr>
         <p:spPr>
           <a:xfrm>
-            <a:off x="3129982" y="3856736"/>
+            <a:off x="3856475" y="2826988"/>
             <a:ext cx="914400" cy="914400"/>
           </a:xfrm>
           <a:prstGeom prst="ellipse">
@@ -4779,7 +4777,7 @@
         </p:nvSpPr>
         <p:spPr>
           <a:xfrm>
-            <a:off x="2116760" y="1276555"/>
+            <a:off x="4036608" y="2840446"/>
             <a:ext cx="914400" cy="914400"/>
           </a:xfrm>
           <a:prstGeom prst="ellipse">

</xml_diff>

<commit_message>
Refactoring while thinking about future structure
</commit_message>
<xml_diff>
--- a/test/files/parts3-a.pptx
+++ b/test/files/parts3-a.pptx
@@ -3545,7 +3545,7 @@
           <p:nvPr>
             <p:extLst>
               <p:ext uri="{D42A27DB-BD31-4B8C-83A1-F6EECF244321}">
-                <p14:modId xmlns:p14="http://schemas.microsoft.com/office/powerpoint/2010/main" val="2424243990"/>
+                <p14:modId xmlns:p14="http://schemas.microsoft.com/office/powerpoint/2010/main" val="205271028"/>
               </p:ext>
             </p:extLst>
           </p:nvPr>
@@ -3979,7 +3979,7 @@
         </p:nvSpPr>
         <p:spPr>
           <a:xfrm>
-            <a:off x="642422" y="4154614"/>
+            <a:off x="5137043" y="3819772"/>
             <a:ext cx="914400" cy="914400"/>
           </a:xfrm>
           <a:prstGeom prst="ellipse">
@@ -4021,7 +4021,7 @@
         </p:nvSpPr>
         <p:spPr>
           <a:xfrm>
-            <a:off x="1928541" y="627801"/>
+            <a:off x="480593" y="2542784"/>
             <a:ext cx="914400" cy="914400"/>
           </a:xfrm>
           <a:prstGeom prst="ellipse">
@@ -4063,7 +4063,7 @@
         </p:nvSpPr>
         <p:spPr>
           <a:xfrm>
-            <a:off x="8768065" y="3300712"/>
+            <a:off x="94653" y="942632"/>
             <a:ext cx="914400" cy="914400"/>
           </a:xfrm>
           <a:prstGeom prst="ellipse">
@@ -4105,7 +4105,7 @@
         </p:nvSpPr>
         <p:spPr>
           <a:xfrm>
-            <a:off x="4164101" y="2122151"/>
+            <a:off x="2566239" y="966706"/>
             <a:ext cx="914400" cy="914400"/>
           </a:xfrm>
           <a:prstGeom prst="ellipse">
@@ -4147,7 +4147,7 @@
         </p:nvSpPr>
         <p:spPr>
           <a:xfrm>
-            <a:off x="300027" y="3177418"/>
+            <a:off x="6010214" y="2120900"/>
             <a:ext cx="914400" cy="914400"/>
           </a:xfrm>
           <a:prstGeom prst="ellipse">
@@ -4189,7 +4189,7 @@
         </p:nvSpPr>
         <p:spPr>
           <a:xfrm>
-            <a:off x="4477294" y="1865791"/>
+            <a:off x="8291268" y="5137406"/>
             <a:ext cx="914400" cy="914400"/>
           </a:xfrm>
           <a:prstGeom prst="ellipse">
@@ -4231,7 +4231,7 @@
         </p:nvSpPr>
         <p:spPr>
           <a:xfrm>
-            <a:off x="2594457" y="2993011"/>
+            <a:off x="7645945" y="2904360"/>
             <a:ext cx="914400" cy="914400"/>
           </a:xfrm>
           <a:prstGeom prst="ellipse">
@@ -4273,7 +4273,7 @@
         </p:nvSpPr>
         <p:spPr>
           <a:xfrm>
-            <a:off x="5390212" y="3704263"/>
+            <a:off x="4289102" y="1057982"/>
             <a:ext cx="914400" cy="914400"/>
           </a:xfrm>
           <a:prstGeom prst="ellipse">
@@ -4315,7 +4315,7 @@
         </p:nvSpPr>
         <p:spPr>
           <a:xfrm>
-            <a:off x="5140590" y="4912792"/>
+            <a:off x="5740701" y="5389607"/>
             <a:ext cx="914400" cy="914400"/>
           </a:xfrm>
           <a:prstGeom prst="ellipse">
@@ -4357,7 +4357,7 @@
         </p:nvSpPr>
         <p:spPr>
           <a:xfrm>
-            <a:off x="5995820" y="4763614"/>
+            <a:off x="5265562" y="2899256"/>
             <a:ext cx="914400" cy="914400"/>
           </a:xfrm>
           <a:prstGeom prst="ellipse">
@@ -4399,7 +4399,7 @@
         </p:nvSpPr>
         <p:spPr>
           <a:xfrm>
-            <a:off x="7476869" y="3159454"/>
+            <a:off x="3549841" y="5397514"/>
             <a:ext cx="914400" cy="914400"/>
           </a:xfrm>
           <a:prstGeom prst="ellipse">
@@ -4441,7 +4441,7 @@
         </p:nvSpPr>
         <p:spPr>
           <a:xfrm>
-            <a:off x="367436" y="1666624"/>
+            <a:off x="9119341" y="5061102"/>
             <a:ext cx="914400" cy="914400"/>
           </a:xfrm>
           <a:prstGeom prst="ellipse">
@@ -4483,7 +4483,7 @@
         </p:nvSpPr>
         <p:spPr>
           <a:xfrm>
-            <a:off x="7648666" y="3569663"/>
+            <a:off x="5249358" y="922796"/>
             <a:ext cx="914400" cy="914400"/>
           </a:xfrm>
           <a:prstGeom prst="ellipse">
@@ -4525,7 +4525,7 @@
         </p:nvSpPr>
         <p:spPr>
           <a:xfrm>
-            <a:off x="2581295" y="2319033"/>
+            <a:off x="3260575" y="3306595"/>
             <a:ext cx="914400" cy="914400"/>
           </a:xfrm>
           <a:prstGeom prst="ellipse">
@@ -4567,7 +4567,7 @@
         </p:nvSpPr>
         <p:spPr>
           <a:xfrm>
-            <a:off x="7116277" y="5326177"/>
+            <a:off x="7361999" y="163455"/>
             <a:ext cx="914400" cy="914400"/>
           </a:xfrm>
           <a:prstGeom prst="ellipse">
@@ -4609,7 +4609,7 @@
         </p:nvSpPr>
         <p:spPr>
           <a:xfrm>
-            <a:off x="5012130" y="993644"/>
+            <a:off x="4468254" y="347628"/>
             <a:ext cx="914400" cy="914400"/>
           </a:xfrm>
           <a:prstGeom prst="ellipse">
@@ -4651,7 +4651,7 @@
         </p:nvSpPr>
         <p:spPr>
           <a:xfrm>
-            <a:off x="4692217" y="3389675"/>
+            <a:off x="7433024" y="4393320"/>
             <a:ext cx="914400" cy="914400"/>
           </a:xfrm>
           <a:prstGeom prst="ellipse">
@@ -4693,7 +4693,7 @@
         </p:nvSpPr>
         <p:spPr>
           <a:xfrm>
-            <a:off x="6591537" y="2022858"/>
+            <a:off x="3152726" y="1361810"/>
             <a:ext cx="914400" cy="914400"/>
           </a:xfrm>
           <a:prstGeom prst="ellipse">
@@ -4735,7 +4735,7 @@
         </p:nvSpPr>
         <p:spPr>
           <a:xfrm>
-            <a:off x="3856475" y="2826988"/>
+            <a:off x="6617914" y="5285327"/>
             <a:ext cx="914400" cy="914400"/>
           </a:xfrm>
           <a:prstGeom prst="ellipse">
@@ -4777,7 +4777,7 @@
         </p:nvSpPr>
         <p:spPr>
           <a:xfrm>
-            <a:off x="4036608" y="2840446"/>
+            <a:off x="4269324" y="3954902"/>
             <a:ext cx="914400" cy="914400"/>
           </a:xfrm>
           <a:prstGeom prst="ellipse">

</xml_diff>